<commit_message>
Background page is created
</commit_message>
<xml_diff>
--- a/HouseRenting.pptx
+++ b/HouseRenting.pptx
@@ -7,6 +7,8 @@
   <p:sldIdLst>
     <p:sldId id="256" r:id="rId2"/>
     <p:sldId id="257" r:id="rId3"/>
+    <p:sldId id="258" r:id="rId4"/>
+    <p:sldId id="259" r:id="rId5"/>
   </p:sldIdLst>
   <p:sldSz cx="12192000" cy="6858000"/>
   <p:notesSz cx="6858000" cy="9144000"/>
@@ -105,6 +107,11 @@
       </a:defRPr>
     </a:lvl9pPr>
   </p:defaultTextStyle>
+  <p:extLst>
+    <p:ext uri="{EFAFB233-063F-42B5-8137-9DF3F51BA10A}">
+      <p15:sldGuideLst xmlns:p15="http://schemas.microsoft.com/office/powerpoint/2012/main"/>
+    </p:ext>
+  </p:extLst>
 </p:presentation>
 </file>
 
@@ -443,7 +450,7 @@
           <a:p>
             <a:fld id="{BE27C8D0-96A9-4B6C-8DFF-D2F542A7F341}" type="datetimeFigureOut">
               <a:rPr lang="en-US" smtClean="0"/>
-              <a:t>9/30/2018</a:t>
+              <a:t>10/4/2018</a:t>
             </a:fld>
             <a:endParaRPr lang="en-US"/>
           </a:p>
@@ -1531,7 +1538,7 @@
           <a:p>
             <a:fld id="{BE27C8D0-96A9-4B6C-8DFF-D2F542A7F341}" type="datetimeFigureOut">
               <a:rPr lang="en-US" smtClean="0"/>
-              <a:t>9/30/2018</a:t>
+              <a:t>10/4/2018</a:t>
             </a:fld>
             <a:endParaRPr lang="en-US"/>
           </a:p>
@@ -2511,7 +2518,7 @@
           <a:p>
             <a:fld id="{BE27C8D0-96A9-4B6C-8DFF-D2F542A7F341}" type="datetimeFigureOut">
               <a:rPr lang="en-US" smtClean="0"/>
-              <a:t>9/30/2018</a:t>
+              <a:t>10/4/2018</a:t>
             </a:fld>
             <a:endParaRPr lang="en-US"/>
           </a:p>
@@ -3645,7 +3652,7 @@
           <a:p>
             <a:fld id="{BE27C8D0-96A9-4B6C-8DFF-D2F542A7F341}" type="datetimeFigureOut">
               <a:rPr lang="en-US" smtClean="0"/>
-              <a:t>9/30/2018</a:t>
+              <a:t>10/4/2018</a:t>
             </a:fld>
             <a:endParaRPr lang="en-US"/>
           </a:p>
@@ -4678,7 +4685,7 @@
           <a:p>
             <a:fld id="{BE27C8D0-96A9-4B6C-8DFF-D2F542A7F341}" type="datetimeFigureOut">
               <a:rPr lang="en-US" smtClean="0"/>
-              <a:t>9/30/2018</a:t>
+              <a:t>10/4/2018</a:t>
             </a:fld>
             <a:endParaRPr lang="en-US"/>
           </a:p>
@@ -5338,7 +5345,7 @@
           <a:p>
             <a:fld id="{BE27C8D0-96A9-4B6C-8DFF-D2F542A7F341}" type="datetimeFigureOut">
               <a:rPr lang="en-US" smtClean="0"/>
-              <a:t>9/30/2018</a:t>
+              <a:t>10/4/2018</a:t>
             </a:fld>
             <a:endParaRPr lang="en-US"/>
           </a:p>
@@ -6199,7 +6206,7 @@
           <a:p>
             <a:fld id="{BE27C8D0-96A9-4B6C-8DFF-D2F542A7F341}" type="datetimeFigureOut">
               <a:rPr lang="en-US" smtClean="0"/>
-              <a:t>9/30/2018</a:t>
+              <a:t>10/4/2018</a:t>
             </a:fld>
             <a:endParaRPr lang="en-US"/>
           </a:p>
@@ -6389,7 +6396,7 @@
           <a:p>
             <a:fld id="{BE27C8D0-96A9-4B6C-8DFF-D2F542A7F341}" type="datetimeFigureOut">
               <a:rPr lang="en-US" smtClean="0"/>
-              <a:t>9/30/2018</a:t>
+              <a:t>10/4/2018</a:t>
             </a:fld>
             <a:endParaRPr lang="en-US"/>
           </a:p>
@@ -7361,7 +7368,7 @@
           <a:p>
             <a:fld id="{BE27C8D0-96A9-4B6C-8DFF-D2F542A7F341}" type="datetimeFigureOut">
               <a:rPr lang="en-US" smtClean="0"/>
-              <a:t>9/30/2018</a:t>
+              <a:t>10/4/2018</a:t>
             </a:fld>
             <a:endParaRPr lang="en-US"/>
           </a:p>
@@ -7572,7 +7579,7 @@
           <a:p>
             <a:fld id="{BE27C8D0-96A9-4B6C-8DFF-D2F542A7F341}" type="datetimeFigureOut">
               <a:rPr lang="en-US" smtClean="0"/>
-              <a:t>9/30/2018</a:t>
+              <a:t>10/4/2018</a:t>
             </a:fld>
             <a:endParaRPr lang="en-US"/>
           </a:p>
@@ -8606,7 +8613,7 @@
           <a:p>
             <a:fld id="{BE27C8D0-96A9-4B6C-8DFF-D2F542A7F341}" type="datetimeFigureOut">
               <a:rPr lang="en-US" smtClean="0"/>
-              <a:t>9/30/2018</a:t>
+              <a:t>10/4/2018</a:t>
             </a:fld>
             <a:endParaRPr lang="en-US"/>
           </a:p>
@@ -8878,7 +8885,7 @@
           <a:p>
             <a:fld id="{BE27C8D0-96A9-4B6C-8DFF-D2F542A7F341}" type="datetimeFigureOut">
               <a:rPr lang="en-US" smtClean="0"/>
-              <a:t>9/30/2018</a:t>
+              <a:t>10/4/2018</a:t>
             </a:fld>
             <a:endParaRPr lang="en-US"/>
           </a:p>
@@ -9288,7 +9295,7 @@
           <a:p>
             <a:fld id="{BE27C8D0-96A9-4B6C-8DFF-D2F542A7F341}" type="datetimeFigureOut">
               <a:rPr lang="en-US" smtClean="0"/>
-              <a:t>9/30/2018</a:t>
+              <a:t>10/4/2018</a:t>
             </a:fld>
             <a:endParaRPr lang="en-US"/>
           </a:p>
@@ -9415,7 +9422,7 @@
           <a:p>
             <a:fld id="{BE27C8D0-96A9-4B6C-8DFF-D2F542A7F341}" type="datetimeFigureOut">
               <a:rPr lang="en-US" smtClean="0"/>
-              <a:t>9/30/2018</a:t>
+              <a:t>10/4/2018</a:t>
             </a:fld>
             <a:endParaRPr lang="en-US"/>
           </a:p>
@@ -9510,7 +9517,7 @@
           <a:p>
             <a:fld id="{BE27C8D0-96A9-4B6C-8DFF-D2F542A7F341}" type="datetimeFigureOut">
               <a:rPr lang="en-US" smtClean="0"/>
-              <a:t>9/30/2018</a:t>
+              <a:t>10/4/2018</a:t>
             </a:fld>
             <a:endParaRPr lang="en-US"/>
           </a:p>
@@ -10591,7 +10598,7 @@
           <a:p>
             <a:fld id="{BE27C8D0-96A9-4B6C-8DFF-D2F542A7F341}" type="datetimeFigureOut">
               <a:rPr lang="en-US" smtClean="0"/>
-              <a:t>9/30/2018</a:t>
+              <a:t>10/4/2018</a:t>
             </a:fld>
             <a:endParaRPr lang="en-US"/>
           </a:p>
@@ -11699,7 +11706,7 @@
           <a:p>
             <a:fld id="{BE27C8D0-96A9-4B6C-8DFF-D2F542A7F341}" type="datetimeFigureOut">
               <a:rPr lang="en-US" smtClean="0"/>
-              <a:t>9/30/2018</a:t>
+              <a:t>10/4/2018</a:t>
             </a:fld>
             <a:endParaRPr lang="en-US"/>
           </a:p>
@@ -12696,7 +12703,7 @@
           <a:p>
             <a:fld id="{BE27C8D0-96A9-4B6C-8DFF-D2F542A7F341}" type="datetimeFigureOut">
               <a:rPr lang="en-US" smtClean="0"/>
-              <a:t>9/30/2018</a:t>
+              <a:t>10/4/2018</a:t>
             </a:fld>
             <a:endParaRPr lang="en-US"/>
           </a:p>
@@ -13508,7 +13515,10 @@
           <a:bodyPr/>
           <a:lstStyle/>
           <a:p>
-            <a:endParaRPr lang="en-US" dirty="0"/>
+            <a:r>
+              <a:rPr lang="en-US" dirty="0"/>
+              <a:t>Objective  of my Project</a:t>
+            </a:r>
           </a:p>
         </p:txBody>
       </p:sp>
@@ -13533,7 +13543,13 @@
           <a:bodyPr/>
           <a:lstStyle/>
           <a:p>
-            <a:endParaRPr lang="en-US"/>
+            <a:pPr marL="0" indent="0">
+              <a:buNone/>
+            </a:pPr>
+            <a:r>
+              <a:rPr lang="en-US" dirty="0"/>
+              <a:t> </a:t>
+            </a:r>
           </a:p>
         </p:txBody>
       </p:sp>
@@ -13541,6 +13557,184 @@
     <p:extLst>
       <p:ext uri="{BB962C8B-B14F-4D97-AF65-F5344CB8AC3E}">
         <p14:creationId xmlns:p14="http://schemas.microsoft.com/office/powerpoint/2010/main" val="3938738532"/>
+      </p:ext>
+    </p:extLst>
+  </p:cSld>
+  <p:clrMapOvr>
+    <a:masterClrMapping/>
+  </p:clrMapOvr>
+</p:sld>
+</file>
+
+<file path=ppt/slides/slide3.xml><?xml version="1.0" encoding="utf-8"?>
+<p:sld xmlns:a="http://schemas.openxmlformats.org/drawingml/2006/main" xmlns:r="http://schemas.openxmlformats.org/officeDocument/2006/relationships" xmlns:p="http://schemas.openxmlformats.org/presentationml/2006/main">
+  <p:cSld>
+    <p:spTree>
+      <p:nvGrpSpPr>
+        <p:cNvPr id="1" name=""/>
+        <p:cNvGrpSpPr/>
+        <p:nvPr/>
+      </p:nvGrpSpPr>
+      <p:grpSpPr>
+        <a:xfrm>
+          <a:off x="0" y="0"/>
+          <a:ext cx="0" cy="0"/>
+          <a:chOff x="0" y="0"/>
+          <a:chExt cx="0" cy="0"/>
+        </a:xfrm>
+      </p:grpSpPr>
+      <p:sp>
+        <p:nvSpPr>
+          <p:cNvPr id="2" name="Title 1">
+            <a:extLst>
+              <a:ext uri="{FF2B5EF4-FFF2-40B4-BE49-F238E27FC236}">
+                <a16:creationId xmlns:a16="http://schemas.microsoft.com/office/drawing/2014/main" id="{73267F4E-09E9-4B27-8439-0BA071506CF5}"/>
+              </a:ext>
+            </a:extLst>
+          </p:cNvPr>
+          <p:cNvSpPr>
+            <a:spLocks noGrp="1"/>
+          </p:cNvSpPr>
+          <p:nvPr>
+            <p:ph type="title"/>
+          </p:nvPr>
+        </p:nvSpPr>
+        <p:spPr/>
+        <p:txBody>
+          <a:bodyPr/>
+          <a:lstStyle/>
+          <a:p>
+            <a:r>
+              <a:rPr lang="en-US" dirty="0"/>
+              <a:t>Background Study</a:t>
+            </a:r>
+          </a:p>
+        </p:txBody>
+      </p:sp>
+      <p:sp>
+        <p:nvSpPr>
+          <p:cNvPr id="3" name="Content Placeholder 2">
+            <a:extLst>
+              <a:ext uri="{FF2B5EF4-FFF2-40B4-BE49-F238E27FC236}">
+                <a16:creationId xmlns:a16="http://schemas.microsoft.com/office/drawing/2014/main" id="{B187BBCC-FF56-471B-9E91-634FA7B0BFD9}"/>
+              </a:ext>
+            </a:extLst>
+          </p:cNvPr>
+          <p:cNvSpPr>
+            <a:spLocks noGrp="1"/>
+          </p:cNvSpPr>
+          <p:nvPr>
+            <p:ph idx="1"/>
+          </p:nvPr>
+        </p:nvSpPr>
+        <p:spPr/>
+        <p:txBody>
+          <a:bodyPr/>
+          <a:lstStyle/>
+          <a:p>
+            <a:pPr marL="0" indent="0">
+              <a:buNone/>
+            </a:pPr>
+            <a:r>
+              <a:rPr lang="en-US" dirty="0"/>
+              <a:t> </a:t>
+            </a:r>
+          </a:p>
+        </p:txBody>
+      </p:sp>
+    </p:spTree>
+    <p:extLst>
+      <p:ext uri="{BB962C8B-B14F-4D97-AF65-F5344CB8AC3E}">
+        <p14:creationId xmlns:p14="http://schemas.microsoft.com/office/powerpoint/2010/main" val="3210426351"/>
+      </p:ext>
+    </p:extLst>
+  </p:cSld>
+  <p:clrMapOvr>
+    <a:masterClrMapping/>
+  </p:clrMapOvr>
+</p:sld>
+</file>
+
+<file path=ppt/slides/slide4.xml><?xml version="1.0" encoding="utf-8"?>
+<p:sld xmlns:a="http://schemas.openxmlformats.org/drawingml/2006/main" xmlns:r="http://schemas.openxmlformats.org/officeDocument/2006/relationships" xmlns:p="http://schemas.openxmlformats.org/presentationml/2006/main">
+  <p:cSld>
+    <p:spTree>
+      <p:nvGrpSpPr>
+        <p:cNvPr id="1" name=""/>
+        <p:cNvGrpSpPr/>
+        <p:nvPr/>
+      </p:nvGrpSpPr>
+      <p:grpSpPr>
+        <a:xfrm>
+          <a:off x="0" y="0"/>
+          <a:ext cx="0" cy="0"/>
+          <a:chOff x="0" y="0"/>
+          <a:chExt cx="0" cy="0"/>
+        </a:xfrm>
+      </p:grpSpPr>
+      <p:sp>
+        <p:nvSpPr>
+          <p:cNvPr id="2" name="Title 1">
+            <a:extLst>
+              <a:ext uri="{FF2B5EF4-FFF2-40B4-BE49-F238E27FC236}">
+                <a16:creationId xmlns:a16="http://schemas.microsoft.com/office/drawing/2014/main" id="{3881622E-D83E-4F1E-A399-5EB00D57D4CF}"/>
+              </a:ext>
+            </a:extLst>
+          </p:cNvPr>
+          <p:cNvSpPr>
+            <a:spLocks noGrp="1"/>
+          </p:cNvSpPr>
+          <p:nvPr>
+            <p:ph type="title"/>
+          </p:nvPr>
+        </p:nvSpPr>
+        <p:spPr/>
+        <p:txBody>
+          <a:bodyPr/>
+          <a:lstStyle/>
+          <a:p>
+            <a:r>
+              <a:rPr lang="en-US" dirty="0"/>
+              <a:t>Feasibility Study</a:t>
+            </a:r>
+          </a:p>
+        </p:txBody>
+      </p:sp>
+      <p:sp>
+        <p:nvSpPr>
+          <p:cNvPr id="3" name="Content Placeholder 2">
+            <a:extLst>
+              <a:ext uri="{FF2B5EF4-FFF2-40B4-BE49-F238E27FC236}">
+                <a16:creationId xmlns:a16="http://schemas.microsoft.com/office/drawing/2014/main" id="{622DC191-E1CA-4F8A-97CC-1105C569B82D}"/>
+              </a:ext>
+            </a:extLst>
+          </p:cNvPr>
+          <p:cNvSpPr>
+            <a:spLocks noGrp="1"/>
+          </p:cNvSpPr>
+          <p:nvPr>
+            <p:ph idx="1"/>
+          </p:nvPr>
+        </p:nvSpPr>
+        <p:spPr/>
+        <p:txBody>
+          <a:bodyPr/>
+          <a:lstStyle/>
+          <a:p>
+            <a:pPr marL="0" indent="0">
+              <a:buNone/>
+            </a:pPr>
+            <a:r>
+              <a:rPr lang="en-US"/>
+              <a:t> </a:t>
+            </a:r>
+          </a:p>
+        </p:txBody>
+      </p:sp>
+    </p:spTree>
+    <p:extLst>
+      <p:ext uri="{BB962C8B-B14F-4D97-AF65-F5344CB8AC3E}">
+        <p14:creationId xmlns:p14="http://schemas.microsoft.com/office/powerpoint/2010/main" val="3694486878"/>
       </p:ext>
     </p:extLst>
   </p:cSld>

</xml_diff>

<commit_message>
Application Area page is created
</commit_message>
<xml_diff>
--- a/HouseRenting.pptx
+++ b/HouseRenting.pptx
@@ -9,6 +9,7 @@
     <p:sldId id="257" r:id="rId3"/>
     <p:sldId id="258" r:id="rId4"/>
     <p:sldId id="259" r:id="rId5"/>
+    <p:sldId id="260" r:id="rId6"/>
   </p:sldIdLst>
   <p:sldSz cx="12192000" cy="6858000"/>
   <p:notesSz cx="6858000" cy="9144000"/>
@@ -13725,10 +13726,9 @@
               <a:buNone/>
             </a:pPr>
             <a:r>
-              <a:rPr lang="en-US"/>
+              <a:rPr lang="en-US" dirty="0"/>
               <a:t> </a:t>
             </a:r>
-            <a:endParaRPr lang="en-US" dirty="0"/>
           </a:p>
         </p:txBody>
       </p:sp>
@@ -13736,6 +13736,95 @@
     <p:extLst>
       <p:ext uri="{BB962C8B-B14F-4D97-AF65-F5344CB8AC3E}">
         <p14:creationId xmlns:p14="http://schemas.microsoft.com/office/powerpoint/2010/main" val="3694486878"/>
+      </p:ext>
+    </p:extLst>
+  </p:cSld>
+  <p:clrMapOvr>
+    <a:masterClrMapping/>
+  </p:clrMapOvr>
+</p:sld>
+</file>
+
+<file path=ppt/slides/slide5.xml><?xml version="1.0" encoding="utf-8"?>
+<p:sld xmlns:a="http://schemas.openxmlformats.org/drawingml/2006/main" xmlns:r="http://schemas.openxmlformats.org/officeDocument/2006/relationships" xmlns:p="http://schemas.openxmlformats.org/presentationml/2006/main">
+  <p:cSld>
+    <p:spTree>
+      <p:nvGrpSpPr>
+        <p:cNvPr id="1" name=""/>
+        <p:cNvGrpSpPr/>
+        <p:nvPr/>
+      </p:nvGrpSpPr>
+      <p:grpSpPr>
+        <a:xfrm>
+          <a:off x="0" y="0"/>
+          <a:ext cx="0" cy="0"/>
+          <a:chOff x="0" y="0"/>
+          <a:chExt cx="0" cy="0"/>
+        </a:xfrm>
+      </p:grpSpPr>
+      <p:sp>
+        <p:nvSpPr>
+          <p:cNvPr id="2" name="Title 1">
+            <a:extLst>
+              <a:ext uri="{FF2B5EF4-FFF2-40B4-BE49-F238E27FC236}">
+                <a16:creationId xmlns:a16="http://schemas.microsoft.com/office/drawing/2014/main" id="{0CCA526C-11EA-4371-8DC0-5A20DA015025}"/>
+              </a:ext>
+            </a:extLst>
+          </p:cNvPr>
+          <p:cNvSpPr>
+            <a:spLocks noGrp="1"/>
+          </p:cNvSpPr>
+          <p:nvPr>
+            <p:ph type="title"/>
+          </p:nvPr>
+        </p:nvSpPr>
+        <p:spPr/>
+        <p:txBody>
+          <a:bodyPr/>
+          <a:lstStyle/>
+          <a:p>
+            <a:r>
+              <a:rPr lang="en-US" dirty="0"/>
+              <a:t>Application Area</a:t>
+            </a:r>
+          </a:p>
+        </p:txBody>
+      </p:sp>
+      <p:sp>
+        <p:nvSpPr>
+          <p:cNvPr id="3" name="Content Placeholder 2">
+            <a:extLst>
+              <a:ext uri="{FF2B5EF4-FFF2-40B4-BE49-F238E27FC236}">
+                <a16:creationId xmlns:a16="http://schemas.microsoft.com/office/drawing/2014/main" id="{30E58F49-8E16-4A04-9A55-911A0E6B0B82}"/>
+              </a:ext>
+            </a:extLst>
+          </p:cNvPr>
+          <p:cNvSpPr>
+            <a:spLocks noGrp="1"/>
+          </p:cNvSpPr>
+          <p:nvPr>
+            <p:ph idx="1"/>
+          </p:nvPr>
+        </p:nvSpPr>
+        <p:spPr/>
+        <p:txBody>
+          <a:bodyPr/>
+          <a:lstStyle/>
+          <a:p>
+            <a:pPr marL="0" indent="0">
+              <a:buNone/>
+            </a:pPr>
+            <a:r>
+              <a:rPr lang="en-US"/>
+              <a:t> </a:t>
+            </a:r>
+          </a:p>
+        </p:txBody>
+      </p:sp>
+    </p:spTree>
+    <p:extLst>
+      <p:ext uri="{BB962C8B-B14F-4D97-AF65-F5344CB8AC3E}">
+        <p14:creationId xmlns:p14="http://schemas.microsoft.com/office/powerpoint/2010/main" val="1859908528"/>
       </p:ext>
     </p:extLst>
   </p:cSld>

</xml_diff>

<commit_message>
Use technology page is created
</commit_message>
<xml_diff>
--- a/HouseRenting.pptx
+++ b/HouseRenting.pptx
@@ -10,6 +10,7 @@
     <p:sldId id="258" r:id="rId4"/>
     <p:sldId id="259" r:id="rId5"/>
     <p:sldId id="260" r:id="rId6"/>
+    <p:sldId id="261" r:id="rId7"/>
   </p:sldIdLst>
   <p:sldSz cx="12192000" cy="6858000"/>
   <p:notesSz cx="6858000" cy="9144000"/>
@@ -13815,7 +13816,7 @@
               <a:buNone/>
             </a:pPr>
             <a:r>
-              <a:rPr lang="en-US"/>
+              <a:rPr lang="en-US" dirty="0"/>
               <a:t> </a:t>
             </a:r>
           </a:p>
@@ -13825,6 +13826,95 @@
     <p:extLst>
       <p:ext uri="{BB962C8B-B14F-4D97-AF65-F5344CB8AC3E}">
         <p14:creationId xmlns:p14="http://schemas.microsoft.com/office/powerpoint/2010/main" val="1859908528"/>
+      </p:ext>
+    </p:extLst>
+  </p:cSld>
+  <p:clrMapOvr>
+    <a:masterClrMapping/>
+  </p:clrMapOvr>
+</p:sld>
+</file>
+
+<file path=ppt/slides/slide6.xml><?xml version="1.0" encoding="utf-8"?>
+<p:sld xmlns:a="http://schemas.openxmlformats.org/drawingml/2006/main" xmlns:r="http://schemas.openxmlformats.org/officeDocument/2006/relationships" xmlns:p="http://schemas.openxmlformats.org/presentationml/2006/main">
+  <p:cSld>
+    <p:spTree>
+      <p:nvGrpSpPr>
+        <p:cNvPr id="1" name=""/>
+        <p:cNvGrpSpPr/>
+        <p:nvPr/>
+      </p:nvGrpSpPr>
+      <p:grpSpPr>
+        <a:xfrm>
+          <a:off x="0" y="0"/>
+          <a:ext cx="0" cy="0"/>
+          <a:chOff x="0" y="0"/>
+          <a:chExt cx="0" cy="0"/>
+        </a:xfrm>
+      </p:grpSpPr>
+      <p:sp>
+        <p:nvSpPr>
+          <p:cNvPr id="2" name="Title 1">
+            <a:extLst>
+              <a:ext uri="{FF2B5EF4-FFF2-40B4-BE49-F238E27FC236}">
+                <a16:creationId xmlns:a16="http://schemas.microsoft.com/office/drawing/2014/main" id="{D4350B92-E475-47B9-AE80-B93489D218AB}"/>
+              </a:ext>
+            </a:extLst>
+          </p:cNvPr>
+          <p:cNvSpPr>
+            <a:spLocks noGrp="1"/>
+          </p:cNvSpPr>
+          <p:nvPr>
+            <p:ph type="title"/>
+          </p:nvPr>
+        </p:nvSpPr>
+        <p:spPr/>
+        <p:txBody>
+          <a:bodyPr/>
+          <a:lstStyle/>
+          <a:p>
+            <a:r>
+              <a:rPr lang="en-US" dirty="0"/>
+              <a:t>Use Technology</a:t>
+            </a:r>
+          </a:p>
+        </p:txBody>
+      </p:sp>
+      <p:sp>
+        <p:nvSpPr>
+          <p:cNvPr id="3" name="Content Placeholder 2">
+            <a:extLst>
+              <a:ext uri="{FF2B5EF4-FFF2-40B4-BE49-F238E27FC236}">
+                <a16:creationId xmlns:a16="http://schemas.microsoft.com/office/drawing/2014/main" id="{F9F6C0F6-48FC-4409-8896-61A48452FE96}"/>
+              </a:ext>
+            </a:extLst>
+          </p:cNvPr>
+          <p:cNvSpPr>
+            <a:spLocks noGrp="1"/>
+          </p:cNvSpPr>
+          <p:nvPr>
+            <p:ph idx="1"/>
+          </p:nvPr>
+        </p:nvSpPr>
+        <p:spPr/>
+        <p:txBody>
+          <a:bodyPr/>
+          <a:lstStyle/>
+          <a:p>
+            <a:pPr marL="0" indent="0">
+              <a:buNone/>
+            </a:pPr>
+            <a:r>
+              <a:rPr lang="en-US"/>
+              <a:t> </a:t>
+            </a:r>
+          </a:p>
+        </p:txBody>
+      </p:sp>
+    </p:spTree>
+    <p:extLst>
+      <p:ext uri="{BB962C8B-B14F-4D97-AF65-F5344CB8AC3E}">
+        <p14:creationId xmlns:p14="http://schemas.microsoft.com/office/powerpoint/2010/main" val="1652468403"/>
       </p:ext>
     </p:extLst>
   </p:cSld>

</xml_diff>

<commit_message>
Implementation page is created
</commit_message>
<xml_diff>
--- a/HouseRenting.pptx
+++ b/HouseRenting.pptx
@@ -11,6 +11,7 @@
     <p:sldId id="259" r:id="rId5"/>
     <p:sldId id="260" r:id="rId6"/>
     <p:sldId id="261" r:id="rId7"/>
+    <p:sldId id="262" r:id="rId8"/>
   </p:sldIdLst>
   <p:sldSz cx="12192000" cy="6858000"/>
   <p:notesSz cx="6858000" cy="9144000"/>
@@ -13905,7 +13906,7 @@
               <a:buNone/>
             </a:pPr>
             <a:r>
-              <a:rPr lang="en-US"/>
+              <a:rPr lang="en-US" dirty="0"/>
               <a:t> </a:t>
             </a:r>
           </a:p>
@@ -13915,6 +13916,95 @@
     <p:extLst>
       <p:ext uri="{BB962C8B-B14F-4D97-AF65-F5344CB8AC3E}">
         <p14:creationId xmlns:p14="http://schemas.microsoft.com/office/powerpoint/2010/main" val="1652468403"/>
+      </p:ext>
+    </p:extLst>
+  </p:cSld>
+  <p:clrMapOvr>
+    <a:masterClrMapping/>
+  </p:clrMapOvr>
+</p:sld>
+</file>
+
+<file path=ppt/slides/slide7.xml><?xml version="1.0" encoding="utf-8"?>
+<p:sld xmlns:a="http://schemas.openxmlformats.org/drawingml/2006/main" xmlns:r="http://schemas.openxmlformats.org/officeDocument/2006/relationships" xmlns:p="http://schemas.openxmlformats.org/presentationml/2006/main">
+  <p:cSld>
+    <p:spTree>
+      <p:nvGrpSpPr>
+        <p:cNvPr id="1" name=""/>
+        <p:cNvGrpSpPr/>
+        <p:nvPr/>
+      </p:nvGrpSpPr>
+      <p:grpSpPr>
+        <a:xfrm>
+          <a:off x="0" y="0"/>
+          <a:ext cx="0" cy="0"/>
+          <a:chOff x="0" y="0"/>
+          <a:chExt cx="0" cy="0"/>
+        </a:xfrm>
+      </p:grpSpPr>
+      <p:sp>
+        <p:nvSpPr>
+          <p:cNvPr id="2" name="Title 1">
+            <a:extLst>
+              <a:ext uri="{FF2B5EF4-FFF2-40B4-BE49-F238E27FC236}">
+                <a16:creationId xmlns:a16="http://schemas.microsoft.com/office/drawing/2014/main" id="{4ABAD137-DF27-46A2-A18E-A7E7E025E33D}"/>
+              </a:ext>
+            </a:extLst>
+          </p:cNvPr>
+          <p:cNvSpPr>
+            <a:spLocks noGrp="1"/>
+          </p:cNvSpPr>
+          <p:nvPr>
+            <p:ph type="title"/>
+          </p:nvPr>
+        </p:nvSpPr>
+        <p:spPr/>
+        <p:txBody>
+          <a:bodyPr/>
+          <a:lstStyle/>
+          <a:p>
+            <a:r>
+              <a:rPr lang="en-US" dirty="0"/>
+              <a:t>Implementation Plan</a:t>
+            </a:r>
+          </a:p>
+        </p:txBody>
+      </p:sp>
+      <p:sp>
+        <p:nvSpPr>
+          <p:cNvPr id="3" name="Content Placeholder 2">
+            <a:extLst>
+              <a:ext uri="{FF2B5EF4-FFF2-40B4-BE49-F238E27FC236}">
+                <a16:creationId xmlns:a16="http://schemas.microsoft.com/office/drawing/2014/main" id="{56219843-90CE-4A69-B45E-C2988A3AA3BB}"/>
+              </a:ext>
+            </a:extLst>
+          </p:cNvPr>
+          <p:cNvSpPr>
+            <a:spLocks noGrp="1"/>
+          </p:cNvSpPr>
+          <p:nvPr>
+            <p:ph idx="1"/>
+          </p:nvPr>
+        </p:nvSpPr>
+        <p:spPr/>
+        <p:txBody>
+          <a:bodyPr/>
+          <a:lstStyle/>
+          <a:p>
+            <a:pPr marL="0" indent="0">
+              <a:buNone/>
+            </a:pPr>
+            <a:r>
+              <a:rPr lang="en-US"/>
+              <a:t> </a:t>
+            </a:r>
+          </a:p>
+        </p:txBody>
+      </p:sp>
+    </p:spTree>
+    <p:extLst>
+      <p:ext uri="{BB962C8B-B14F-4D97-AF65-F5344CB8AC3E}">
+        <p14:creationId xmlns:p14="http://schemas.microsoft.com/office/powerpoint/2010/main" val="4243813945"/>
       </p:ext>
     </p:extLst>
   </p:cSld>

</xml_diff>

<commit_message>
expected Outcome page is created
</commit_message>
<xml_diff>
--- a/HouseRenting.pptx
+++ b/HouseRenting.pptx
@@ -12,6 +12,7 @@
     <p:sldId id="260" r:id="rId6"/>
     <p:sldId id="261" r:id="rId7"/>
     <p:sldId id="262" r:id="rId8"/>
+    <p:sldId id="263" r:id="rId9"/>
   </p:sldIdLst>
   <p:sldSz cx="12192000" cy="6858000"/>
   <p:notesSz cx="6858000" cy="9144000"/>
@@ -13995,7 +13996,7 @@
               <a:buNone/>
             </a:pPr>
             <a:r>
-              <a:rPr lang="en-US"/>
+              <a:rPr lang="en-US" dirty="0"/>
               <a:t> </a:t>
             </a:r>
           </a:p>
@@ -14005,6 +14006,96 @@
     <p:extLst>
       <p:ext uri="{BB962C8B-B14F-4D97-AF65-F5344CB8AC3E}">
         <p14:creationId xmlns:p14="http://schemas.microsoft.com/office/powerpoint/2010/main" val="4243813945"/>
+      </p:ext>
+    </p:extLst>
+  </p:cSld>
+  <p:clrMapOvr>
+    <a:masterClrMapping/>
+  </p:clrMapOvr>
+</p:sld>
+</file>
+
+<file path=ppt/slides/slide8.xml><?xml version="1.0" encoding="utf-8"?>
+<p:sld xmlns:a="http://schemas.openxmlformats.org/drawingml/2006/main" xmlns:r="http://schemas.openxmlformats.org/officeDocument/2006/relationships" xmlns:p="http://schemas.openxmlformats.org/presentationml/2006/main">
+  <p:cSld>
+    <p:spTree>
+      <p:nvGrpSpPr>
+        <p:cNvPr id="1" name=""/>
+        <p:cNvGrpSpPr/>
+        <p:nvPr/>
+      </p:nvGrpSpPr>
+      <p:grpSpPr>
+        <a:xfrm>
+          <a:off x="0" y="0"/>
+          <a:ext cx="0" cy="0"/>
+          <a:chOff x="0" y="0"/>
+          <a:chExt cx="0" cy="0"/>
+        </a:xfrm>
+      </p:grpSpPr>
+      <p:sp>
+        <p:nvSpPr>
+          <p:cNvPr id="2" name="Title 1">
+            <a:extLst>
+              <a:ext uri="{FF2B5EF4-FFF2-40B4-BE49-F238E27FC236}">
+                <a16:creationId xmlns:a16="http://schemas.microsoft.com/office/drawing/2014/main" id="{4ABAD137-DF27-46A2-A18E-A7E7E025E33D}"/>
+              </a:ext>
+            </a:extLst>
+          </p:cNvPr>
+          <p:cNvSpPr>
+            <a:spLocks noGrp="1"/>
+          </p:cNvSpPr>
+          <p:nvPr>
+            <p:ph type="title"/>
+          </p:nvPr>
+        </p:nvSpPr>
+        <p:spPr/>
+        <p:txBody>
+          <a:bodyPr/>
+          <a:lstStyle/>
+          <a:p>
+            <a:r>
+              <a:rPr lang="en-US"/>
+              <a:t>Expected Outcome</a:t>
+            </a:r>
+            <a:endParaRPr lang="en-US" dirty="0"/>
+          </a:p>
+        </p:txBody>
+      </p:sp>
+      <p:sp>
+        <p:nvSpPr>
+          <p:cNvPr id="3" name="Content Placeholder 2">
+            <a:extLst>
+              <a:ext uri="{FF2B5EF4-FFF2-40B4-BE49-F238E27FC236}">
+                <a16:creationId xmlns:a16="http://schemas.microsoft.com/office/drawing/2014/main" id="{56219843-90CE-4A69-B45E-C2988A3AA3BB}"/>
+              </a:ext>
+            </a:extLst>
+          </p:cNvPr>
+          <p:cNvSpPr>
+            <a:spLocks noGrp="1"/>
+          </p:cNvSpPr>
+          <p:nvPr>
+            <p:ph idx="1"/>
+          </p:nvPr>
+        </p:nvSpPr>
+        <p:spPr/>
+        <p:txBody>
+          <a:bodyPr/>
+          <a:lstStyle/>
+          <a:p>
+            <a:pPr marL="0" indent="0">
+              <a:buNone/>
+            </a:pPr>
+            <a:r>
+              <a:rPr lang="en-US" dirty="0"/>
+              <a:t> </a:t>
+            </a:r>
+          </a:p>
+        </p:txBody>
+      </p:sp>
+    </p:spTree>
+    <p:extLst>
+      <p:ext uri="{BB962C8B-B14F-4D97-AF65-F5344CB8AC3E}">
+        <p14:creationId xmlns:p14="http://schemas.microsoft.com/office/powerpoint/2010/main" val="1847214280"/>
       </p:ext>
     </p:extLst>
   </p:cSld>

</xml_diff>

<commit_message>
Weakness of Our Project page is created
</commit_message>
<xml_diff>
--- a/HouseRenting.pptx
+++ b/HouseRenting.pptx
@@ -13,6 +13,7 @@
     <p:sldId id="261" r:id="rId7"/>
     <p:sldId id="262" r:id="rId8"/>
     <p:sldId id="263" r:id="rId9"/>
+    <p:sldId id="264" r:id="rId10"/>
   </p:sldIdLst>
   <p:sldSz cx="12192000" cy="6858000"/>
   <p:notesSz cx="6858000" cy="9144000"/>
@@ -14054,10 +14055,9 @@
           <a:lstStyle/>
           <a:p>
             <a:r>
-              <a:rPr lang="en-US"/>
+              <a:rPr lang="en-US" dirty="0"/>
               <a:t>Expected Outcome</a:t>
             </a:r>
-            <a:endParaRPr lang="en-US" dirty="0"/>
           </a:p>
         </p:txBody>
       </p:sp>
@@ -14096,6 +14096,100 @@
     <p:extLst>
       <p:ext uri="{BB962C8B-B14F-4D97-AF65-F5344CB8AC3E}">
         <p14:creationId xmlns:p14="http://schemas.microsoft.com/office/powerpoint/2010/main" val="1847214280"/>
+      </p:ext>
+    </p:extLst>
+  </p:cSld>
+  <p:clrMapOvr>
+    <a:masterClrMapping/>
+  </p:clrMapOvr>
+</p:sld>
+</file>
+
+<file path=ppt/slides/slide9.xml><?xml version="1.0" encoding="utf-8"?>
+<p:sld xmlns:a="http://schemas.openxmlformats.org/drawingml/2006/main" xmlns:r="http://schemas.openxmlformats.org/officeDocument/2006/relationships" xmlns:p="http://schemas.openxmlformats.org/presentationml/2006/main">
+  <p:cSld>
+    <p:spTree>
+      <p:nvGrpSpPr>
+        <p:cNvPr id="1" name=""/>
+        <p:cNvGrpSpPr/>
+        <p:nvPr/>
+      </p:nvGrpSpPr>
+      <p:grpSpPr>
+        <a:xfrm>
+          <a:off x="0" y="0"/>
+          <a:ext cx="0" cy="0"/>
+          <a:chOff x="0" y="0"/>
+          <a:chExt cx="0" cy="0"/>
+        </a:xfrm>
+      </p:grpSpPr>
+      <p:sp>
+        <p:nvSpPr>
+          <p:cNvPr id="2" name="Title 1">
+            <a:extLst>
+              <a:ext uri="{FF2B5EF4-FFF2-40B4-BE49-F238E27FC236}">
+                <a16:creationId xmlns:a16="http://schemas.microsoft.com/office/drawing/2014/main" id="{4ABAD137-DF27-46A2-A18E-A7E7E025E33D}"/>
+              </a:ext>
+            </a:extLst>
+          </p:cNvPr>
+          <p:cNvSpPr>
+            <a:spLocks noGrp="1"/>
+          </p:cNvSpPr>
+          <p:nvPr>
+            <p:ph type="title"/>
+          </p:nvPr>
+        </p:nvSpPr>
+        <p:spPr/>
+        <p:txBody>
+          <a:bodyPr/>
+          <a:lstStyle/>
+          <a:p>
+            <a:r>
+              <a:rPr lang="en-US" dirty="0"/>
+              <a:t>Weakness of </a:t>
+            </a:r>
+            <a:r>
+              <a:rPr lang="en-US"/>
+              <a:t>Our Project</a:t>
+            </a:r>
+            <a:endParaRPr lang="en-US" dirty="0"/>
+          </a:p>
+        </p:txBody>
+      </p:sp>
+      <p:sp>
+        <p:nvSpPr>
+          <p:cNvPr id="3" name="Content Placeholder 2">
+            <a:extLst>
+              <a:ext uri="{FF2B5EF4-FFF2-40B4-BE49-F238E27FC236}">
+                <a16:creationId xmlns:a16="http://schemas.microsoft.com/office/drawing/2014/main" id="{56219843-90CE-4A69-B45E-C2988A3AA3BB}"/>
+              </a:ext>
+            </a:extLst>
+          </p:cNvPr>
+          <p:cNvSpPr>
+            <a:spLocks noGrp="1"/>
+          </p:cNvSpPr>
+          <p:nvPr>
+            <p:ph idx="1"/>
+          </p:nvPr>
+        </p:nvSpPr>
+        <p:spPr/>
+        <p:txBody>
+          <a:bodyPr/>
+          <a:lstStyle/>
+          <a:p>
+            <a:pPr marL="0" indent="0">
+              <a:buNone/>
+            </a:pPr>
+            <a:r>
+              <a:rPr lang="en-US" dirty="0"/>
+              <a:t> </a:t>
+            </a:r>
+          </a:p>
+        </p:txBody>
+      </p:sp>
+    </p:spTree>
+    <p:extLst>
+      <p:ext uri="{BB962C8B-B14F-4D97-AF65-F5344CB8AC3E}">
+        <p14:creationId xmlns:p14="http://schemas.microsoft.com/office/powerpoint/2010/main" val="969379202"/>
       </p:ext>
     </p:extLst>
   </p:cSld>

</xml_diff>

<commit_message>
Future Plan page is created
</commit_message>
<xml_diff>
--- a/HouseRenting.pptx
+++ b/HouseRenting.pptx
@@ -14,6 +14,7 @@
     <p:sldId id="262" r:id="rId8"/>
     <p:sldId id="263" r:id="rId9"/>
     <p:sldId id="264" r:id="rId10"/>
+    <p:sldId id="265" r:id="rId11"/>
   </p:sldIdLst>
   <p:sldSz cx="12192000" cy="6858000"/>
   <p:notesSz cx="6858000" cy="9144000"/>
@@ -13482,6 +13483,95 @@
 </p:sld>
 </file>
 
+<file path=ppt/slides/slide10.xml><?xml version="1.0" encoding="utf-8"?>
+<p:sld xmlns:a="http://schemas.openxmlformats.org/drawingml/2006/main" xmlns:r="http://schemas.openxmlformats.org/officeDocument/2006/relationships" xmlns:p="http://schemas.openxmlformats.org/presentationml/2006/main">
+  <p:cSld>
+    <p:spTree>
+      <p:nvGrpSpPr>
+        <p:cNvPr id="1" name=""/>
+        <p:cNvGrpSpPr/>
+        <p:nvPr/>
+      </p:nvGrpSpPr>
+      <p:grpSpPr>
+        <a:xfrm>
+          <a:off x="0" y="0"/>
+          <a:ext cx="0" cy="0"/>
+          <a:chOff x="0" y="0"/>
+          <a:chExt cx="0" cy="0"/>
+        </a:xfrm>
+      </p:grpSpPr>
+      <p:sp>
+        <p:nvSpPr>
+          <p:cNvPr id="2" name="Title 1">
+            <a:extLst>
+              <a:ext uri="{FF2B5EF4-FFF2-40B4-BE49-F238E27FC236}">
+                <a16:creationId xmlns:a16="http://schemas.microsoft.com/office/drawing/2014/main" id="{4ABAD137-DF27-46A2-A18E-A7E7E025E33D}"/>
+              </a:ext>
+            </a:extLst>
+          </p:cNvPr>
+          <p:cNvSpPr>
+            <a:spLocks noGrp="1"/>
+          </p:cNvSpPr>
+          <p:nvPr>
+            <p:ph type="title"/>
+          </p:nvPr>
+        </p:nvSpPr>
+        <p:spPr/>
+        <p:txBody>
+          <a:bodyPr/>
+          <a:lstStyle/>
+          <a:p>
+            <a:r>
+              <a:rPr lang="en-US" dirty="0"/>
+              <a:t>Future Plan</a:t>
+            </a:r>
+          </a:p>
+        </p:txBody>
+      </p:sp>
+      <p:sp>
+        <p:nvSpPr>
+          <p:cNvPr id="3" name="Content Placeholder 2">
+            <a:extLst>
+              <a:ext uri="{FF2B5EF4-FFF2-40B4-BE49-F238E27FC236}">
+                <a16:creationId xmlns:a16="http://schemas.microsoft.com/office/drawing/2014/main" id="{56219843-90CE-4A69-B45E-C2988A3AA3BB}"/>
+              </a:ext>
+            </a:extLst>
+          </p:cNvPr>
+          <p:cNvSpPr>
+            <a:spLocks noGrp="1"/>
+          </p:cNvSpPr>
+          <p:nvPr>
+            <p:ph idx="1"/>
+          </p:nvPr>
+        </p:nvSpPr>
+        <p:spPr/>
+        <p:txBody>
+          <a:bodyPr/>
+          <a:lstStyle/>
+          <a:p>
+            <a:pPr marL="0" indent="0">
+              <a:buNone/>
+            </a:pPr>
+            <a:r>
+              <a:rPr lang="en-US" dirty="0"/>
+              <a:t> </a:t>
+            </a:r>
+          </a:p>
+        </p:txBody>
+      </p:sp>
+    </p:spTree>
+    <p:extLst>
+      <p:ext uri="{BB962C8B-B14F-4D97-AF65-F5344CB8AC3E}">
+        <p14:creationId xmlns:p14="http://schemas.microsoft.com/office/powerpoint/2010/main" val="3456328565"/>
+      </p:ext>
+    </p:extLst>
+  </p:cSld>
+  <p:clrMapOvr>
+    <a:masterClrMapping/>
+  </p:clrMapOvr>
+</p:sld>
+</file>
+
 <file path=ppt/slides/slide2.xml><?xml version="1.0" encoding="utf-8"?>
 <p:sld xmlns:a="http://schemas.openxmlformats.org/drawingml/2006/main" xmlns:r="http://schemas.openxmlformats.org/officeDocument/2006/relationships" xmlns:p="http://schemas.openxmlformats.org/presentationml/2006/main">
   <p:cSld>
@@ -14145,13 +14235,8 @@
           <a:p>
             <a:r>
               <a:rPr lang="en-US" dirty="0"/>
-              <a:t>Weakness of </a:t>
+              <a:t>Weakness of Our Project</a:t>
             </a:r>
-            <a:r>
-              <a:rPr lang="en-US"/>
-              <a:t>Our Project</a:t>
-            </a:r>
-            <a:endParaRPr lang="en-US" dirty="0"/>
           </a:p>
         </p:txBody>
       </p:sp>

</xml_diff>

<commit_message>
Use technology content is added
</commit_message>
<xml_diff>
--- a/HouseRenting.pptx
+++ b/HouseRenting.pptx
@@ -15,6 +15,7 @@
     <p:sldId id="263" r:id="rId9"/>
     <p:sldId id="264" r:id="rId10"/>
     <p:sldId id="265" r:id="rId11"/>
+    <p:sldId id="266" r:id="rId12"/>
   </p:sldIdLst>
   <p:sldSz cx="12192000" cy="6858000"/>
   <p:notesSz cx="6858000" cy="9144000"/>
@@ -13572,6 +13573,96 @@
 </p:sld>
 </file>
 
+<file path=ppt/slides/slide11.xml><?xml version="1.0" encoding="utf-8"?>
+<p:sld xmlns:a="http://schemas.openxmlformats.org/drawingml/2006/main" xmlns:r="http://schemas.openxmlformats.org/officeDocument/2006/relationships" xmlns:p="http://schemas.openxmlformats.org/presentationml/2006/main">
+  <p:cSld>
+    <p:spTree>
+      <p:nvGrpSpPr>
+        <p:cNvPr id="1" name=""/>
+        <p:cNvGrpSpPr/>
+        <p:nvPr/>
+      </p:nvGrpSpPr>
+      <p:grpSpPr>
+        <a:xfrm>
+          <a:off x="0" y="0"/>
+          <a:ext cx="0" cy="0"/>
+          <a:chOff x="0" y="0"/>
+          <a:chExt cx="0" cy="0"/>
+        </a:xfrm>
+      </p:grpSpPr>
+      <p:sp>
+        <p:nvSpPr>
+          <p:cNvPr id="2" name="Title 1">
+            <a:extLst>
+              <a:ext uri="{FF2B5EF4-FFF2-40B4-BE49-F238E27FC236}">
+                <a16:creationId xmlns:a16="http://schemas.microsoft.com/office/drawing/2014/main" id="{4ABAD137-DF27-46A2-A18E-A7E7E025E33D}"/>
+              </a:ext>
+            </a:extLst>
+          </p:cNvPr>
+          <p:cNvSpPr>
+            <a:spLocks noGrp="1"/>
+          </p:cNvSpPr>
+          <p:nvPr>
+            <p:ph type="title"/>
+          </p:nvPr>
+        </p:nvSpPr>
+        <p:spPr/>
+        <p:txBody>
+          <a:bodyPr/>
+          <a:lstStyle/>
+          <a:p>
+            <a:r>
+              <a:rPr lang="en-US" dirty="0" err="1"/>
+              <a:t>Conclution</a:t>
+            </a:r>
+            <a:endParaRPr lang="en-US" dirty="0"/>
+          </a:p>
+        </p:txBody>
+      </p:sp>
+      <p:sp>
+        <p:nvSpPr>
+          <p:cNvPr id="3" name="Content Placeholder 2">
+            <a:extLst>
+              <a:ext uri="{FF2B5EF4-FFF2-40B4-BE49-F238E27FC236}">
+                <a16:creationId xmlns:a16="http://schemas.microsoft.com/office/drawing/2014/main" id="{56219843-90CE-4A69-B45E-C2988A3AA3BB}"/>
+              </a:ext>
+            </a:extLst>
+          </p:cNvPr>
+          <p:cNvSpPr>
+            <a:spLocks noGrp="1"/>
+          </p:cNvSpPr>
+          <p:nvPr>
+            <p:ph idx="1"/>
+          </p:nvPr>
+        </p:nvSpPr>
+        <p:spPr/>
+        <p:txBody>
+          <a:bodyPr/>
+          <a:lstStyle/>
+          <a:p>
+            <a:pPr marL="0" indent="0">
+              <a:buNone/>
+            </a:pPr>
+            <a:r>
+              <a:rPr lang="en-US" dirty="0"/>
+              <a:t> </a:t>
+            </a:r>
+          </a:p>
+        </p:txBody>
+      </p:sp>
+    </p:spTree>
+    <p:extLst>
+      <p:ext uri="{BB962C8B-B14F-4D97-AF65-F5344CB8AC3E}">
+        <p14:creationId xmlns:p14="http://schemas.microsoft.com/office/powerpoint/2010/main" val="2297170349"/>
+      </p:ext>
+    </p:extLst>
+  </p:cSld>
+  <p:clrMapOvr>
+    <a:masterClrMapping/>
+  </p:clrMapOvr>
+</p:sld>
+</file>
+
 <file path=ppt/slides/slide2.xml><?xml version="1.0" encoding="utf-8"?>
 <p:sld xmlns:a="http://schemas.openxmlformats.org/drawingml/2006/main" xmlns:r="http://schemas.openxmlformats.org/officeDocument/2006/relationships" xmlns:p="http://schemas.openxmlformats.org/presentationml/2006/main">
   <p:cSld>
@@ -13973,37 +14064,381 @@
           </a:p>
         </p:txBody>
       </p:sp>
-      <p:sp>
-        <p:nvSpPr>
-          <p:cNvPr id="3" name="Content Placeholder 2">
+      <p:graphicFrame>
+        <p:nvGraphicFramePr>
+          <p:cNvPr id="16" name="Content Placeholder 15">
             <a:extLst>
               <a:ext uri="{FF2B5EF4-FFF2-40B4-BE49-F238E27FC236}">
-                <a16:creationId xmlns:a16="http://schemas.microsoft.com/office/drawing/2014/main" id="{F9F6C0F6-48FC-4409-8896-61A48452FE96}"/>
+                <a16:creationId xmlns:a16="http://schemas.microsoft.com/office/drawing/2014/main" id="{EA482A45-EBC0-4EFD-B753-CE3863160320}"/>
               </a:ext>
             </a:extLst>
           </p:cNvPr>
-          <p:cNvSpPr>
-            <a:spLocks noGrp="1"/>
-          </p:cNvSpPr>
+          <p:cNvGraphicFramePr>
+            <a:graphicFrameLocks noGrp="1"/>
+          </p:cNvGraphicFramePr>
           <p:nvPr>
             <p:ph idx="1"/>
+            <p:extLst>
+              <p:ext uri="{D42A27DB-BD31-4B8C-83A1-F6EECF244321}">
+                <p14:modId xmlns:p14="http://schemas.microsoft.com/office/powerpoint/2010/main" val="2870255533"/>
+              </p:ext>
+            </p:extLst>
           </p:nvPr>
-        </p:nvSpPr>
-        <p:spPr/>
-        <p:txBody>
-          <a:bodyPr/>
-          <a:lstStyle/>
-          <a:p>
-            <a:pPr marL="0" indent="0">
-              <a:buNone/>
-            </a:pPr>
-            <a:r>
-              <a:rPr lang="en-US" dirty="0"/>
-              <a:t> </a:t>
-            </a:r>
-          </a:p>
-        </p:txBody>
-      </p:sp>
+        </p:nvGraphicFramePr>
+        <p:xfrm>
+          <a:off x="1694962" y="2800448"/>
+          <a:ext cx="4401038" cy="2880360"/>
+        </p:xfrm>
+        <a:graphic>
+          <a:graphicData uri="http://schemas.openxmlformats.org/drawingml/2006/table">
+            <a:tbl>
+              <a:tblPr firstRow="1" bandRow="1">
+                <a:tableStyleId>{2D5ABB26-0587-4C30-8999-92F81FD0307C}</a:tableStyleId>
+              </a:tblPr>
+              <a:tblGrid>
+                <a:gridCol w="4401038">
+                  <a:extLst>
+                    <a:ext uri="{9D8B030D-6E8A-4147-A177-3AD203B41FA5}">
+                      <a16:colId xmlns:a16="http://schemas.microsoft.com/office/drawing/2014/main" val="2786390887"/>
+                    </a:ext>
+                  </a:extLst>
+                </a:gridCol>
+              </a:tblGrid>
+              <a:tr h="370840">
+                <a:tc>
+                  <a:txBody>
+                    <a:bodyPr/>
+                    <a:lstStyle/>
+                    <a:p>
+                      <a:pPr marL="285750" indent="-285750">
+                        <a:buFont typeface="Wingdings" panose="05000000000000000000" pitchFamily="2" charset="2"/>
+                        <a:buChar char="q"/>
+                      </a:pPr>
+                      <a:r>
+                        <a:rPr lang="en-US" sz="2600" dirty="0"/>
+                        <a:t>Server Side</a:t>
+                      </a:r>
+                    </a:p>
+                  </a:txBody>
+                  <a:tcPr/>
+                </a:tc>
+                <a:extLst>
+                  <a:ext uri="{0D108BD9-81ED-4DB2-BD59-A6C34878D82A}">
+                    <a16:rowId xmlns:a16="http://schemas.microsoft.com/office/drawing/2014/main" val="646730074"/>
+                  </a:ext>
+                </a:extLst>
+              </a:tr>
+              <a:tr h="370840">
+                <a:tc>
+                  <a:txBody>
+                    <a:bodyPr/>
+                    <a:lstStyle/>
+                    <a:p>
+                      <a:pPr marL="742950" lvl="1" indent="-285750">
+                        <a:buFont typeface="Wingdings" panose="05000000000000000000" pitchFamily="2" charset="2"/>
+                        <a:buChar char="q"/>
+                      </a:pPr>
+                      <a:r>
+                        <a:rPr lang="en-US" sz="2200" dirty="0"/>
+                        <a:t>Language</a:t>
+                      </a:r>
+                    </a:p>
+                  </a:txBody>
+                  <a:tcPr/>
+                </a:tc>
+                <a:extLst>
+                  <a:ext uri="{0D108BD9-81ED-4DB2-BD59-A6C34878D82A}">
+                    <a16:rowId xmlns:a16="http://schemas.microsoft.com/office/drawing/2014/main" val="795173613"/>
+                  </a:ext>
+                </a:extLst>
+              </a:tr>
+              <a:tr h="370840">
+                <a:tc>
+                  <a:txBody>
+                    <a:bodyPr/>
+                    <a:lstStyle/>
+                    <a:p>
+                      <a:pPr marL="1200150" lvl="2" indent="-285750">
+                        <a:buFont typeface="Wingdings" panose="05000000000000000000" pitchFamily="2" charset="2"/>
+                        <a:buChar char="Ø"/>
+                      </a:pPr>
+                      <a:r>
+                        <a:rPr lang="en-US" dirty="0"/>
+                        <a:t>JavaScript</a:t>
+                      </a:r>
+                    </a:p>
+                  </a:txBody>
+                  <a:tcPr/>
+                </a:tc>
+                <a:extLst>
+                  <a:ext uri="{0D108BD9-81ED-4DB2-BD59-A6C34878D82A}">
+                    <a16:rowId xmlns:a16="http://schemas.microsoft.com/office/drawing/2014/main" val="549785315"/>
+                  </a:ext>
+                </a:extLst>
+              </a:tr>
+              <a:tr h="370840">
+                <a:tc>
+                  <a:txBody>
+                    <a:bodyPr/>
+                    <a:lstStyle/>
+                    <a:p>
+                      <a:pPr marL="742950" lvl="1" indent="-285750">
+                        <a:buFont typeface="Wingdings" panose="05000000000000000000" pitchFamily="2" charset="2"/>
+                        <a:buChar char="q"/>
+                      </a:pPr>
+                      <a:r>
+                        <a:rPr lang="en-US" sz="2200" dirty="0"/>
+                        <a:t>Framework</a:t>
+                      </a:r>
+                    </a:p>
+                  </a:txBody>
+                  <a:tcPr/>
+                </a:tc>
+                <a:extLst>
+                  <a:ext uri="{0D108BD9-81ED-4DB2-BD59-A6C34878D82A}">
+                    <a16:rowId xmlns:a16="http://schemas.microsoft.com/office/drawing/2014/main" val="3601202269"/>
+                  </a:ext>
+                </a:extLst>
+              </a:tr>
+              <a:tr h="370840">
+                <a:tc>
+                  <a:txBody>
+                    <a:bodyPr/>
+                    <a:lstStyle/>
+                    <a:p>
+                      <a:pPr marL="1200150" lvl="2" indent="-285750">
+                        <a:buFont typeface="Wingdings" panose="05000000000000000000" pitchFamily="2" charset="2"/>
+                        <a:buChar char="Ø"/>
+                      </a:pPr>
+                      <a:r>
+                        <a:rPr lang="en-US" dirty="0"/>
+                        <a:t>Node JS</a:t>
+                      </a:r>
+                    </a:p>
+                  </a:txBody>
+                  <a:tcPr/>
+                </a:tc>
+                <a:extLst>
+                  <a:ext uri="{0D108BD9-81ED-4DB2-BD59-A6C34878D82A}">
+                    <a16:rowId xmlns:a16="http://schemas.microsoft.com/office/drawing/2014/main" val="964169676"/>
+                  </a:ext>
+                </a:extLst>
+              </a:tr>
+              <a:tr h="370840">
+                <a:tc>
+                  <a:txBody>
+                    <a:bodyPr/>
+                    <a:lstStyle/>
+                    <a:p>
+                      <a:pPr marL="742950" lvl="1" indent="-285750">
+                        <a:buFont typeface="Wingdings" panose="05000000000000000000" pitchFamily="2" charset="2"/>
+                        <a:buChar char="q"/>
+                      </a:pPr>
+                      <a:r>
+                        <a:rPr lang="en-US" sz="2200" dirty="0"/>
+                        <a:t>Database</a:t>
+                      </a:r>
+                    </a:p>
+                  </a:txBody>
+                  <a:tcPr/>
+                </a:tc>
+                <a:extLst>
+                  <a:ext uri="{0D108BD9-81ED-4DB2-BD59-A6C34878D82A}">
+                    <a16:rowId xmlns:a16="http://schemas.microsoft.com/office/drawing/2014/main" val="1279960137"/>
+                  </a:ext>
+                </a:extLst>
+              </a:tr>
+              <a:tr h="370840">
+                <a:tc>
+                  <a:txBody>
+                    <a:bodyPr/>
+                    <a:lstStyle/>
+                    <a:p>
+                      <a:pPr marL="1200150" lvl="2" indent="-285750">
+                        <a:buFont typeface="Wingdings" panose="05000000000000000000" pitchFamily="2" charset="2"/>
+                        <a:buChar char="Ø"/>
+                      </a:pPr>
+                      <a:r>
+                        <a:rPr lang="en-US" dirty="0"/>
+                        <a:t>MongoDB</a:t>
+                      </a:r>
+                    </a:p>
+                  </a:txBody>
+                  <a:tcPr/>
+                </a:tc>
+                <a:extLst>
+                  <a:ext uri="{0D108BD9-81ED-4DB2-BD59-A6C34878D82A}">
+                    <a16:rowId xmlns:a16="http://schemas.microsoft.com/office/drawing/2014/main" val="2550903803"/>
+                  </a:ext>
+                </a:extLst>
+              </a:tr>
+            </a:tbl>
+          </a:graphicData>
+        </a:graphic>
+      </p:graphicFrame>
+      <p:graphicFrame>
+        <p:nvGraphicFramePr>
+          <p:cNvPr id="17" name="Content Placeholder 15">
+            <a:extLst>
+              <a:ext uri="{FF2B5EF4-FFF2-40B4-BE49-F238E27FC236}">
+                <a16:creationId xmlns:a16="http://schemas.microsoft.com/office/drawing/2014/main" id="{76C54405-57B0-4FF6-BCDA-C7E334C99BAF}"/>
+              </a:ext>
+            </a:extLst>
+          </p:cNvPr>
+          <p:cNvGraphicFramePr>
+            <a:graphicFrameLocks/>
+          </p:cNvGraphicFramePr>
+          <p:nvPr>
+            <p:extLst>
+              <p:ext uri="{D42A27DB-BD31-4B8C-83A1-F6EECF244321}">
+                <p14:modId xmlns:p14="http://schemas.microsoft.com/office/powerpoint/2010/main" val="520541432"/>
+              </p:ext>
+            </p:extLst>
+          </p:nvPr>
+        </p:nvGraphicFramePr>
+        <p:xfrm>
+          <a:off x="6283571" y="2800448"/>
+          <a:ext cx="4401038" cy="2194560"/>
+        </p:xfrm>
+        <a:graphic>
+          <a:graphicData uri="http://schemas.openxmlformats.org/drawingml/2006/table">
+            <a:tbl>
+              <a:tblPr firstRow="1" bandRow="1">
+                <a:tableStyleId>{2D5ABB26-0587-4C30-8999-92F81FD0307C}</a:tableStyleId>
+              </a:tblPr>
+              <a:tblGrid>
+                <a:gridCol w="4401038">
+                  <a:extLst>
+                    <a:ext uri="{9D8B030D-6E8A-4147-A177-3AD203B41FA5}">
+                      <a16:colId xmlns:a16="http://schemas.microsoft.com/office/drawing/2014/main" val="2786390887"/>
+                    </a:ext>
+                  </a:extLst>
+                </a:gridCol>
+              </a:tblGrid>
+              <a:tr h="370840">
+                <a:tc>
+                  <a:txBody>
+                    <a:bodyPr/>
+                    <a:lstStyle/>
+                    <a:p>
+                      <a:pPr marL="285750" indent="-285750">
+                        <a:buFont typeface="Wingdings" panose="05000000000000000000" pitchFamily="2" charset="2"/>
+                        <a:buChar char="q"/>
+                      </a:pPr>
+                      <a:r>
+                        <a:rPr lang="en-US" sz="2600" dirty="0"/>
+                        <a:t>Client Side</a:t>
+                      </a:r>
+                    </a:p>
+                  </a:txBody>
+                  <a:tcPr/>
+                </a:tc>
+                <a:extLst>
+                  <a:ext uri="{0D108BD9-81ED-4DB2-BD59-A6C34878D82A}">
+                    <a16:rowId xmlns:a16="http://schemas.microsoft.com/office/drawing/2014/main" val="646730074"/>
+                  </a:ext>
+                </a:extLst>
+              </a:tr>
+              <a:tr h="370840">
+                <a:tc>
+                  <a:txBody>
+                    <a:bodyPr/>
+                    <a:lstStyle/>
+                    <a:p>
+                      <a:pPr marL="800100" lvl="1" indent="-342900">
+                        <a:buFont typeface="Wingdings" panose="05000000000000000000" pitchFamily="2" charset="2"/>
+                        <a:buChar char="Ø"/>
+                      </a:pPr>
+                      <a:r>
+                        <a:rPr lang="en-US" sz="2200" dirty="0"/>
+                        <a:t>HTML</a:t>
+                      </a:r>
+                    </a:p>
+                  </a:txBody>
+                  <a:tcPr/>
+                </a:tc>
+                <a:extLst>
+                  <a:ext uri="{0D108BD9-81ED-4DB2-BD59-A6C34878D82A}">
+                    <a16:rowId xmlns:a16="http://schemas.microsoft.com/office/drawing/2014/main" val="795173613"/>
+                  </a:ext>
+                </a:extLst>
+              </a:tr>
+              <a:tr h="370840">
+                <a:tc>
+                  <a:txBody>
+                    <a:bodyPr/>
+                    <a:lstStyle/>
+                    <a:p>
+                      <a:pPr marL="800100" lvl="1" indent="-342900">
+                        <a:buFont typeface="Wingdings" panose="05000000000000000000" pitchFamily="2" charset="2"/>
+                        <a:buChar char="Ø"/>
+                      </a:pPr>
+                      <a:r>
+                        <a:rPr lang="en-US" sz="2200" dirty="0"/>
+                        <a:t>CSS</a:t>
+                      </a:r>
+                    </a:p>
+                  </a:txBody>
+                  <a:tcPr/>
+                </a:tc>
+                <a:extLst>
+                  <a:ext uri="{0D108BD9-81ED-4DB2-BD59-A6C34878D82A}">
+                    <a16:rowId xmlns:a16="http://schemas.microsoft.com/office/drawing/2014/main" val="3601202269"/>
+                  </a:ext>
+                </a:extLst>
+              </a:tr>
+              <a:tr h="370840">
+                <a:tc>
+                  <a:txBody>
+                    <a:bodyPr/>
+                    <a:lstStyle/>
+                    <a:p>
+                      <a:pPr marL="800100" lvl="1" indent="-342900">
+                        <a:buFont typeface="Wingdings" panose="05000000000000000000" pitchFamily="2" charset="2"/>
+                        <a:buChar char="Ø"/>
+                      </a:pPr>
+                      <a:r>
+                        <a:rPr lang="en-US" sz="2200" dirty="0"/>
+                        <a:t>Bootstrap 4</a:t>
+                      </a:r>
+                    </a:p>
+                  </a:txBody>
+                  <a:tcPr/>
+                </a:tc>
+                <a:extLst>
+                  <a:ext uri="{0D108BD9-81ED-4DB2-BD59-A6C34878D82A}">
+                    <a16:rowId xmlns:a16="http://schemas.microsoft.com/office/drawing/2014/main" val="1279960137"/>
+                  </a:ext>
+                </a:extLst>
+              </a:tr>
+              <a:tr h="370840">
+                <a:tc>
+                  <a:txBody>
+                    <a:bodyPr/>
+                    <a:lstStyle/>
+                    <a:p>
+                      <a:pPr marL="800100" lvl="1" indent="-342900">
+                        <a:buFont typeface="Wingdings" panose="05000000000000000000" pitchFamily="2" charset="2"/>
+                        <a:buChar char="Ø"/>
+                      </a:pPr>
+                      <a:r>
+                        <a:rPr lang="en-US" sz="2200" dirty="0"/>
+                        <a:t>Angular 6</a:t>
+                      </a:r>
+                    </a:p>
+                  </a:txBody>
+                  <a:tcPr/>
+                </a:tc>
+                <a:extLst>
+                  <a:ext uri="{0D108BD9-81ED-4DB2-BD59-A6C34878D82A}">
+                    <a16:rowId xmlns:a16="http://schemas.microsoft.com/office/drawing/2014/main" val="2550903803"/>
+                  </a:ext>
+                </a:extLst>
+              </a:tr>
+            </a:tbl>
+          </a:graphicData>
+        </a:graphic>
+      </p:graphicFrame>
     </p:spTree>
     <p:extLst>
       <p:ext uri="{BB962C8B-B14F-4D97-AF65-F5344CB8AC3E}">

</xml_diff>

<commit_message>
houserent definition is added
</commit_message>
<xml_diff>
--- a/HouseRenting.pptx
+++ b/HouseRenting.pptx
@@ -6,16 +6,17 @@
   </p:sldMasterIdLst>
   <p:sldIdLst>
     <p:sldId id="256" r:id="rId2"/>
-    <p:sldId id="257" r:id="rId3"/>
-    <p:sldId id="258" r:id="rId4"/>
-    <p:sldId id="259" r:id="rId5"/>
-    <p:sldId id="260" r:id="rId6"/>
-    <p:sldId id="261" r:id="rId7"/>
-    <p:sldId id="262" r:id="rId8"/>
-    <p:sldId id="263" r:id="rId9"/>
-    <p:sldId id="264" r:id="rId10"/>
-    <p:sldId id="265" r:id="rId11"/>
-    <p:sldId id="266" r:id="rId12"/>
+    <p:sldId id="267" r:id="rId3"/>
+    <p:sldId id="257" r:id="rId4"/>
+    <p:sldId id="258" r:id="rId5"/>
+    <p:sldId id="259" r:id="rId6"/>
+    <p:sldId id="260" r:id="rId7"/>
+    <p:sldId id="261" r:id="rId8"/>
+    <p:sldId id="262" r:id="rId9"/>
+    <p:sldId id="263" r:id="rId10"/>
+    <p:sldId id="264" r:id="rId11"/>
+    <p:sldId id="265" r:id="rId12"/>
+    <p:sldId id="266" r:id="rId13"/>
   </p:sldIdLst>
   <p:sldSz cx="12192000" cy="6858000"/>
   <p:notesSz cx="6858000" cy="9144000"/>
@@ -457,7 +458,7 @@
           <a:p>
             <a:fld id="{BE27C8D0-96A9-4B6C-8DFF-D2F542A7F341}" type="datetimeFigureOut">
               <a:rPr lang="en-US" smtClean="0"/>
-              <a:t>10/4/2018</a:t>
+              <a:t>10/8/2018</a:t>
             </a:fld>
             <a:endParaRPr lang="en-US"/>
           </a:p>
@@ -1545,7 +1546,7 @@
           <a:p>
             <a:fld id="{BE27C8D0-96A9-4B6C-8DFF-D2F542A7F341}" type="datetimeFigureOut">
               <a:rPr lang="en-US" smtClean="0"/>
-              <a:t>10/4/2018</a:t>
+              <a:t>10/8/2018</a:t>
             </a:fld>
             <a:endParaRPr lang="en-US"/>
           </a:p>
@@ -2525,7 +2526,7 @@
           <a:p>
             <a:fld id="{BE27C8D0-96A9-4B6C-8DFF-D2F542A7F341}" type="datetimeFigureOut">
               <a:rPr lang="en-US" smtClean="0"/>
-              <a:t>10/4/2018</a:t>
+              <a:t>10/8/2018</a:t>
             </a:fld>
             <a:endParaRPr lang="en-US"/>
           </a:p>
@@ -3659,7 +3660,7 @@
           <a:p>
             <a:fld id="{BE27C8D0-96A9-4B6C-8DFF-D2F542A7F341}" type="datetimeFigureOut">
               <a:rPr lang="en-US" smtClean="0"/>
-              <a:t>10/4/2018</a:t>
+              <a:t>10/8/2018</a:t>
             </a:fld>
             <a:endParaRPr lang="en-US"/>
           </a:p>
@@ -4692,7 +4693,7 @@
           <a:p>
             <a:fld id="{BE27C8D0-96A9-4B6C-8DFF-D2F542A7F341}" type="datetimeFigureOut">
               <a:rPr lang="en-US" smtClean="0"/>
-              <a:t>10/4/2018</a:t>
+              <a:t>10/8/2018</a:t>
             </a:fld>
             <a:endParaRPr lang="en-US"/>
           </a:p>
@@ -5352,7 +5353,7 @@
           <a:p>
             <a:fld id="{BE27C8D0-96A9-4B6C-8DFF-D2F542A7F341}" type="datetimeFigureOut">
               <a:rPr lang="en-US" smtClean="0"/>
-              <a:t>10/4/2018</a:t>
+              <a:t>10/8/2018</a:t>
             </a:fld>
             <a:endParaRPr lang="en-US"/>
           </a:p>
@@ -6213,7 +6214,7 @@
           <a:p>
             <a:fld id="{BE27C8D0-96A9-4B6C-8DFF-D2F542A7F341}" type="datetimeFigureOut">
               <a:rPr lang="en-US" smtClean="0"/>
-              <a:t>10/4/2018</a:t>
+              <a:t>10/8/2018</a:t>
             </a:fld>
             <a:endParaRPr lang="en-US"/>
           </a:p>
@@ -6403,7 +6404,7 @@
           <a:p>
             <a:fld id="{BE27C8D0-96A9-4B6C-8DFF-D2F542A7F341}" type="datetimeFigureOut">
               <a:rPr lang="en-US" smtClean="0"/>
-              <a:t>10/4/2018</a:t>
+              <a:t>10/8/2018</a:t>
             </a:fld>
             <a:endParaRPr lang="en-US"/>
           </a:p>
@@ -7375,7 +7376,7 @@
           <a:p>
             <a:fld id="{BE27C8D0-96A9-4B6C-8DFF-D2F542A7F341}" type="datetimeFigureOut">
               <a:rPr lang="en-US" smtClean="0"/>
-              <a:t>10/4/2018</a:t>
+              <a:t>10/8/2018</a:t>
             </a:fld>
             <a:endParaRPr lang="en-US"/>
           </a:p>
@@ -7586,7 +7587,7 @@
           <a:p>
             <a:fld id="{BE27C8D0-96A9-4B6C-8DFF-D2F542A7F341}" type="datetimeFigureOut">
               <a:rPr lang="en-US" smtClean="0"/>
-              <a:t>10/4/2018</a:t>
+              <a:t>10/8/2018</a:t>
             </a:fld>
             <a:endParaRPr lang="en-US"/>
           </a:p>
@@ -8620,7 +8621,7 @@
           <a:p>
             <a:fld id="{BE27C8D0-96A9-4B6C-8DFF-D2F542A7F341}" type="datetimeFigureOut">
               <a:rPr lang="en-US" smtClean="0"/>
-              <a:t>10/4/2018</a:t>
+              <a:t>10/8/2018</a:t>
             </a:fld>
             <a:endParaRPr lang="en-US"/>
           </a:p>
@@ -8892,7 +8893,7 @@
           <a:p>
             <a:fld id="{BE27C8D0-96A9-4B6C-8DFF-D2F542A7F341}" type="datetimeFigureOut">
               <a:rPr lang="en-US" smtClean="0"/>
-              <a:t>10/4/2018</a:t>
+              <a:t>10/8/2018</a:t>
             </a:fld>
             <a:endParaRPr lang="en-US"/>
           </a:p>
@@ -9302,7 +9303,7 @@
           <a:p>
             <a:fld id="{BE27C8D0-96A9-4B6C-8DFF-D2F542A7F341}" type="datetimeFigureOut">
               <a:rPr lang="en-US" smtClean="0"/>
-              <a:t>10/4/2018</a:t>
+              <a:t>10/8/2018</a:t>
             </a:fld>
             <a:endParaRPr lang="en-US"/>
           </a:p>
@@ -9429,7 +9430,7 @@
           <a:p>
             <a:fld id="{BE27C8D0-96A9-4B6C-8DFF-D2F542A7F341}" type="datetimeFigureOut">
               <a:rPr lang="en-US" smtClean="0"/>
-              <a:t>10/4/2018</a:t>
+              <a:t>10/8/2018</a:t>
             </a:fld>
             <a:endParaRPr lang="en-US"/>
           </a:p>
@@ -9524,7 +9525,7 @@
           <a:p>
             <a:fld id="{BE27C8D0-96A9-4B6C-8DFF-D2F542A7F341}" type="datetimeFigureOut">
               <a:rPr lang="en-US" smtClean="0"/>
-              <a:t>10/4/2018</a:t>
+              <a:t>10/8/2018</a:t>
             </a:fld>
             <a:endParaRPr lang="en-US"/>
           </a:p>
@@ -10605,7 +10606,7 @@
           <a:p>
             <a:fld id="{BE27C8D0-96A9-4B6C-8DFF-D2F542A7F341}" type="datetimeFigureOut">
               <a:rPr lang="en-US" smtClean="0"/>
-              <a:t>10/4/2018</a:t>
+              <a:t>10/8/2018</a:t>
             </a:fld>
             <a:endParaRPr lang="en-US"/>
           </a:p>
@@ -11713,7 +11714,7 @@
           <a:p>
             <a:fld id="{BE27C8D0-96A9-4B6C-8DFF-D2F542A7F341}" type="datetimeFigureOut">
               <a:rPr lang="en-US" smtClean="0"/>
-              <a:t>10/4/2018</a:t>
+              <a:t>10/8/2018</a:t>
             </a:fld>
             <a:endParaRPr lang="en-US"/>
           </a:p>
@@ -12710,7 +12711,7 @@
           <a:p>
             <a:fld id="{BE27C8D0-96A9-4B6C-8DFF-D2F542A7F341}" type="datetimeFigureOut">
               <a:rPr lang="en-US" smtClean="0"/>
-              <a:t>10/4/2018</a:t>
+              <a:t>10/8/2018</a:t>
             </a:fld>
             <a:endParaRPr lang="en-US"/>
           </a:p>
@@ -13524,7 +13525,7 @@
           <a:p>
             <a:r>
               <a:rPr lang="en-US" dirty="0"/>
-              <a:t>Future Plan</a:t>
+              <a:t>Weakness of Our Project</a:t>
             </a:r>
           </a:p>
         </p:txBody>
@@ -13550,8 +13551,9 @@
           <a:bodyPr/>
           <a:lstStyle/>
           <a:p>
-            <a:pPr marL="0" indent="0">
-              <a:buNone/>
+            <a:pPr>
+              <a:buFont typeface="Wingdings" panose="05000000000000000000" pitchFamily="2" charset="2"/>
+              <a:buChar char="q"/>
             </a:pPr>
             <a:r>
               <a:rPr lang="en-US" dirty="0"/>
@@ -13563,7 +13565,7 @@
     </p:spTree>
     <p:extLst>
       <p:ext uri="{BB962C8B-B14F-4D97-AF65-F5344CB8AC3E}">
-        <p14:creationId xmlns:p14="http://schemas.microsoft.com/office/powerpoint/2010/main" val="3456328565"/>
+        <p14:creationId xmlns:p14="http://schemas.microsoft.com/office/powerpoint/2010/main" val="969379202"/>
       </p:ext>
     </p:extLst>
   </p:cSld>
@@ -13612,10 +13614,98 @@
           <a:lstStyle/>
           <a:p>
             <a:r>
-              <a:rPr lang="en-US" dirty="0" err="1"/>
-              <a:t>Conclution</a:t>
+              <a:rPr lang="en-US" dirty="0"/>
+              <a:t>Future Plan</a:t>
             </a:r>
-            <a:endParaRPr lang="en-US" dirty="0"/>
+          </a:p>
+        </p:txBody>
+      </p:sp>
+      <p:sp>
+        <p:nvSpPr>
+          <p:cNvPr id="3" name="Content Placeholder 2">
+            <a:extLst>
+              <a:ext uri="{FF2B5EF4-FFF2-40B4-BE49-F238E27FC236}">
+                <a16:creationId xmlns:a16="http://schemas.microsoft.com/office/drawing/2014/main" id="{56219843-90CE-4A69-B45E-C2988A3AA3BB}"/>
+              </a:ext>
+            </a:extLst>
+          </p:cNvPr>
+          <p:cNvSpPr>
+            <a:spLocks noGrp="1"/>
+          </p:cNvSpPr>
+          <p:nvPr>
+            <p:ph idx="1"/>
+          </p:nvPr>
+        </p:nvSpPr>
+        <p:spPr/>
+        <p:txBody>
+          <a:bodyPr/>
+          <a:lstStyle/>
+          <a:p>
+            <a:pPr marL="0" indent="0">
+              <a:buNone/>
+            </a:pPr>
+            <a:r>
+              <a:rPr lang="en-US" dirty="0"/>
+              <a:t> </a:t>
+            </a:r>
+          </a:p>
+        </p:txBody>
+      </p:sp>
+    </p:spTree>
+    <p:extLst>
+      <p:ext uri="{BB962C8B-B14F-4D97-AF65-F5344CB8AC3E}">
+        <p14:creationId xmlns:p14="http://schemas.microsoft.com/office/powerpoint/2010/main" val="3456328565"/>
+      </p:ext>
+    </p:extLst>
+  </p:cSld>
+  <p:clrMapOvr>
+    <a:masterClrMapping/>
+  </p:clrMapOvr>
+</p:sld>
+</file>
+
+<file path=ppt/slides/slide12.xml><?xml version="1.0" encoding="utf-8"?>
+<p:sld xmlns:a="http://schemas.openxmlformats.org/drawingml/2006/main" xmlns:r="http://schemas.openxmlformats.org/officeDocument/2006/relationships" xmlns:p="http://schemas.openxmlformats.org/presentationml/2006/main">
+  <p:cSld>
+    <p:spTree>
+      <p:nvGrpSpPr>
+        <p:cNvPr id="1" name=""/>
+        <p:cNvGrpSpPr/>
+        <p:nvPr/>
+      </p:nvGrpSpPr>
+      <p:grpSpPr>
+        <a:xfrm>
+          <a:off x="0" y="0"/>
+          <a:ext cx="0" cy="0"/>
+          <a:chOff x="0" y="0"/>
+          <a:chExt cx="0" cy="0"/>
+        </a:xfrm>
+      </p:grpSpPr>
+      <p:sp>
+        <p:nvSpPr>
+          <p:cNvPr id="2" name="Title 1">
+            <a:extLst>
+              <a:ext uri="{FF2B5EF4-FFF2-40B4-BE49-F238E27FC236}">
+                <a16:creationId xmlns:a16="http://schemas.microsoft.com/office/drawing/2014/main" id="{4ABAD137-DF27-46A2-A18E-A7E7E025E33D}"/>
+              </a:ext>
+            </a:extLst>
+          </p:cNvPr>
+          <p:cNvSpPr>
+            <a:spLocks noGrp="1"/>
+          </p:cNvSpPr>
+          <p:nvPr>
+            <p:ph type="title"/>
+          </p:nvPr>
+        </p:nvSpPr>
+        <p:spPr/>
+        <p:txBody>
+          <a:bodyPr/>
+          <a:lstStyle/>
+          <a:p>
+            <a:r>
+              <a:rPr lang="en-US" dirty="0"/>
+              <a:t>Conclusion</a:t>
+            </a:r>
           </a:p>
         </p:txBody>
       </p:sp>
@@ -13685,6 +13775,111 @@
           <p:cNvPr id="2" name="Title 1">
             <a:extLst>
               <a:ext uri="{FF2B5EF4-FFF2-40B4-BE49-F238E27FC236}">
+                <a16:creationId xmlns:a16="http://schemas.microsoft.com/office/drawing/2014/main" id="{B89ADE99-89AF-4356-9DF9-CE91F2C05167}"/>
+              </a:ext>
+            </a:extLst>
+          </p:cNvPr>
+          <p:cNvSpPr>
+            <a:spLocks noGrp="1"/>
+          </p:cNvSpPr>
+          <p:nvPr>
+            <p:ph type="title"/>
+          </p:nvPr>
+        </p:nvSpPr>
+        <p:spPr/>
+        <p:txBody>
+          <a:bodyPr/>
+          <a:lstStyle/>
+          <a:p>
+            <a:r>
+              <a:rPr lang="en-US" dirty="0"/>
+              <a:t>What is House Renting?</a:t>
+            </a:r>
+          </a:p>
+        </p:txBody>
+      </p:sp>
+      <p:sp>
+        <p:nvSpPr>
+          <p:cNvPr id="3" name="Content Placeholder 2">
+            <a:extLst>
+              <a:ext uri="{FF2B5EF4-FFF2-40B4-BE49-F238E27FC236}">
+                <a16:creationId xmlns:a16="http://schemas.microsoft.com/office/drawing/2014/main" id="{AAA42EAB-0EB5-4D28-A842-B26EB0BA001F}"/>
+              </a:ext>
+            </a:extLst>
+          </p:cNvPr>
+          <p:cNvSpPr>
+            <a:spLocks noGrp="1"/>
+          </p:cNvSpPr>
+          <p:nvPr>
+            <p:ph idx="1"/>
+          </p:nvPr>
+        </p:nvSpPr>
+        <p:spPr/>
+        <p:txBody>
+          <a:bodyPr/>
+          <a:lstStyle/>
+          <a:p>
+            <a:pPr>
+              <a:buFont typeface="Wingdings" panose="05000000000000000000" pitchFamily="2" charset="2"/>
+              <a:buChar char="q"/>
+            </a:pPr>
+            <a:r>
+              <a:rPr lang="en-US" sz="2000" dirty="0"/>
+              <a:t>House renting is a process that is People can advertising his or her own </a:t>
+            </a:r>
+            <a:r>
+              <a:rPr lang="en-US" sz="2000"/>
+              <a:t>house or </a:t>
+            </a:r>
+            <a:r>
+              <a:rPr lang="en-US" sz="2000" dirty="0"/>
+              <a:t>People can view house advertisement who want to rent house.</a:t>
+            </a:r>
+          </a:p>
+          <a:p>
+            <a:pPr>
+              <a:buFont typeface="Wingdings" panose="05000000000000000000" pitchFamily="2" charset="2"/>
+              <a:buChar char="q"/>
+            </a:pPr>
+            <a:endParaRPr lang="en-US" sz="2000" dirty="0"/>
+          </a:p>
+        </p:txBody>
+      </p:sp>
+    </p:spTree>
+    <p:extLst>
+      <p:ext uri="{BB962C8B-B14F-4D97-AF65-F5344CB8AC3E}">
+        <p14:creationId xmlns:p14="http://schemas.microsoft.com/office/powerpoint/2010/main" val="1266950323"/>
+      </p:ext>
+    </p:extLst>
+  </p:cSld>
+  <p:clrMapOvr>
+    <a:masterClrMapping/>
+  </p:clrMapOvr>
+</p:sld>
+</file>
+
+<file path=ppt/slides/slide3.xml><?xml version="1.0" encoding="utf-8"?>
+<p:sld xmlns:a="http://schemas.openxmlformats.org/drawingml/2006/main" xmlns:r="http://schemas.openxmlformats.org/officeDocument/2006/relationships" xmlns:p="http://schemas.openxmlformats.org/presentationml/2006/main">
+  <p:cSld>
+    <p:spTree>
+      <p:nvGrpSpPr>
+        <p:cNvPr id="1" name=""/>
+        <p:cNvGrpSpPr/>
+        <p:nvPr/>
+      </p:nvGrpSpPr>
+      <p:grpSpPr>
+        <a:xfrm>
+          <a:off x="0" y="0"/>
+          <a:ext cx="0" cy="0"/>
+          <a:chOff x="0" y="0"/>
+          <a:chExt cx="0" cy="0"/>
+        </a:xfrm>
+      </p:grpSpPr>
+      <p:sp>
+        <p:nvSpPr>
+          <p:cNvPr id="2" name="Title 1">
+            <a:extLst>
+              <a:ext uri="{FF2B5EF4-FFF2-40B4-BE49-F238E27FC236}">
                 <a16:creationId xmlns:a16="http://schemas.microsoft.com/office/drawing/2014/main" id="{6B98F740-6360-4ECF-AD29-7FD2389ED3A3}"/>
               </a:ext>
             </a:extLst>
@@ -13752,7 +13947,7 @@
 </p:sld>
 </file>
 
-<file path=ppt/slides/slide3.xml><?xml version="1.0" encoding="utf-8"?>
+<file path=ppt/slides/slide4.xml><?xml version="1.0" encoding="utf-8"?>
 <p:sld xmlns:a="http://schemas.openxmlformats.org/drawingml/2006/main" xmlns:r="http://schemas.openxmlformats.org/officeDocument/2006/relationships" xmlns:p="http://schemas.openxmlformats.org/presentationml/2006/main">
   <p:cSld>
     <p:spTree>
@@ -13841,7 +14036,7 @@
 </p:sld>
 </file>
 
-<file path=ppt/slides/slide4.xml><?xml version="1.0" encoding="utf-8"?>
+<file path=ppt/slides/slide5.xml><?xml version="1.0" encoding="utf-8"?>
 <p:sld xmlns:a="http://schemas.openxmlformats.org/drawingml/2006/main" xmlns:r="http://schemas.openxmlformats.org/officeDocument/2006/relationships" xmlns:p="http://schemas.openxmlformats.org/presentationml/2006/main">
   <p:cSld>
     <p:spTree>
@@ -13907,12 +14102,13 @@
           <a:bodyPr/>
           <a:lstStyle/>
           <a:p>
-            <a:pPr marL="0" indent="0">
-              <a:buNone/>
+            <a:pPr>
+              <a:buFont typeface="Wingdings" panose="05000000000000000000" pitchFamily="2" charset="2"/>
+              <a:buChar char="q"/>
             </a:pPr>
             <a:r>
               <a:rPr lang="en-US" dirty="0"/>
-              <a:t> </a:t>
+              <a:t>  </a:t>
             </a:r>
           </a:p>
         </p:txBody>
@@ -13930,7 +14126,7 @@
 </p:sld>
 </file>
 
-<file path=ppt/slides/slide5.xml><?xml version="1.0" encoding="utf-8"?>
+<file path=ppt/slides/slide6.xml><?xml version="1.0" encoding="utf-8"?>
 <p:sld xmlns:a="http://schemas.openxmlformats.org/drawingml/2006/main" xmlns:r="http://schemas.openxmlformats.org/officeDocument/2006/relationships" xmlns:p="http://schemas.openxmlformats.org/presentationml/2006/main">
   <p:cSld>
     <p:spTree>
@@ -14019,7 +14215,7 @@
 </p:sld>
 </file>
 
-<file path=ppt/slides/slide6.xml><?xml version="1.0" encoding="utf-8"?>
+<file path=ppt/slides/slide7.xml><?xml version="1.0" encoding="utf-8"?>
 <p:sld xmlns:a="http://schemas.openxmlformats.org/drawingml/2006/main" xmlns:r="http://schemas.openxmlformats.org/officeDocument/2006/relationships" xmlns:p="http://schemas.openxmlformats.org/presentationml/2006/main">
   <p:cSld>
     <p:spTree>
@@ -14452,95 +14648,6 @@
 </p:sld>
 </file>
 
-<file path=ppt/slides/slide7.xml><?xml version="1.0" encoding="utf-8"?>
-<p:sld xmlns:a="http://schemas.openxmlformats.org/drawingml/2006/main" xmlns:r="http://schemas.openxmlformats.org/officeDocument/2006/relationships" xmlns:p="http://schemas.openxmlformats.org/presentationml/2006/main">
-  <p:cSld>
-    <p:spTree>
-      <p:nvGrpSpPr>
-        <p:cNvPr id="1" name=""/>
-        <p:cNvGrpSpPr/>
-        <p:nvPr/>
-      </p:nvGrpSpPr>
-      <p:grpSpPr>
-        <a:xfrm>
-          <a:off x="0" y="0"/>
-          <a:ext cx="0" cy="0"/>
-          <a:chOff x="0" y="0"/>
-          <a:chExt cx="0" cy="0"/>
-        </a:xfrm>
-      </p:grpSpPr>
-      <p:sp>
-        <p:nvSpPr>
-          <p:cNvPr id="2" name="Title 1">
-            <a:extLst>
-              <a:ext uri="{FF2B5EF4-FFF2-40B4-BE49-F238E27FC236}">
-                <a16:creationId xmlns:a16="http://schemas.microsoft.com/office/drawing/2014/main" id="{4ABAD137-DF27-46A2-A18E-A7E7E025E33D}"/>
-              </a:ext>
-            </a:extLst>
-          </p:cNvPr>
-          <p:cNvSpPr>
-            <a:spLocks noGrp="1"/>
-          </p:cNvSpPr>
-          <p:nvPr>
-            <p:ph type="title"/>
-          </p:nvPr>
-        </p:nvSpPr>
-        <p:spPr/>
-        <p:txBody>
-          <a:bodyPr/>
-          <a:lstStyle/>
-          <a:p>
-            <a:r>
-              <a:rPr lang="en-US" dirty="0"/>
-              <a:t>Implementation Plan</a:t>
-            </a:r>
-          </a:p>
-        </p:txBody>
-      </p:sp>
-      <p:sp>
-        <p:nvSpPr>
-          <p:cNvPr id="3" name="Content Placeholder 2">
-            <a:extLst>
-              <a:ext uri="{FF2B5EF4-FFF2-40B4-BE49-F238E27FC236}">
-                <a16:creationId xmlns:a16="http://schemas.microsoft.com/office/drawing/2014/main" id="{56219843-90CE-4A69-B45E-C2988A3AA3BB}"/>
-              </a:ext>
-            </a:extLst>
-          </p:cNvPr>
-          <p:cNvSpPr>
-            <a:spLocks noGrp="1"/>
-          </p:cNvSpPr>
-          <p:nvPr>
-            <p:ph idx="1"/>
-          </p:nvPr>
-        </p:nvSpPr>
-        <p:spPr/>
-        <p:txBody>
-          <a:bodyPr/>
-          <a:lstStyle/>
-          <a:p>
-            <a:pPr marL="0" indent="0">
-              <a:buNone/>
-            </a:pPr>
-            <a:r>
-              <a:rPr lang="en-US" dirty="0"/>
-              <a:t> </a:t>
-            </a:r>
-          </a:p>
-        </p:txBody>
-      </p:sp>
-    </p:spTree>
-    <p:extLst>
-      <p:ext uri="{BB962C8B-B14F-4D97-AF65-F5344CB8AC3E}">
-        <p14:creationId xmlns:p14="http://schemas.microsoft.com/office/powerpoint/2010/main" val="4243813945"/>
-      </p:ext>
-    </p:extLst>
-  </p:cSld>
-  <p:clrMapOvr>
-    <a:masterClrMapping/>
-  </p:clrMapOvr>
-</p:sld>
-</file>
-
 <file path=ppt/slides/slide8.xml><?xml version="1.0" encoding="utf-8"?>
 <p:sld xmlns:a="http://schemas.openxmlformats.org/drawingml/2006/main" xmlns:r="http://schemas.openxmlformats.org/officeDocument/2006/relationships" xmlns:p="http://schemas.openxmlformats.org/presentationml/2006/main">
   <p:cSld>
@@ -14581,7 +14688,7 @@
           <a:p>
             <a:r>
               <a:rPr lang="en-US" dirty="0"/>
-              <a:t>Expected Outcome</a:t>
+              <a:t>Implementation Plan</a:t>
             </a:r>
           </a:p>
         </p:txBody>
@@ -14620,7 +14727,7 @@
     </p:spTree>
     <p:extLst>
       <p:ext uri="{BB962C8B-B14F-4D97-AF65-F5344CB8AC3E}">
-        <p14:creationId xmlns:p14="http://schemas.microsoft.com/office/powerpoint/2010/main" val="1847214280"/>
+        <p14:creationId xmlns:p14="http://schemas.microsoft.com/office/powerpoint/2010/main" val="4243813945"/>
       </p:ext>
     </p:extLst>
   </p:cSld>
@@ -14670,7 +14777,7 @@
           <a:p>
             <a:r>
               <a:rPr lang="en-US" dirty="0"/>
-              <a:t>Weakness of Our Project</a:t>
+              <a:t>Expected Outcome</a:t>
             </a:r>
           </a:p>
         </p:txBody>
@@ -14709,7 +14816,7 @@
     </p:spTree>
     <p:extLst>
       <p:ext uri="{BB962C8B-B14F-4D97-AF65-F5344CB8AC3E}">
-        <p14:creationId xmlns:p14="http://schemas.microsoft.com/office/powerpoint/2010/main" val="969379202"/>
+        <p14:creationId xmlns:p14="http://schemas.microsoft.com/office/powerpoint/2010/main" val="1847214280"/>
       </p:ext>
     </p:extLst>
   </p:cSld>

</xml_diff>

<commit_message>
some content is removed
</commit_message>
<xml_diff>
--- a/HouseRenting.pptx
+++ b/HouseRenting.pptx
@@ -14211,29 +14211,10 @@
               <a:buChar char="Ø"/>
             </a:pPr>
             <a:r>
-              <a:rPr lang="en-US" sz="1800" dirty="0"/>
-              <a:t>Legal Feasibility:</a:t>
+              <a:rPr lang="en-US" sz="1800"/>
+              <a:t>Environmenttal:</a:t>
             </a:r>
-          </a:p>
-          <a:p>
-            <a:pPr lvl="1">
-              <a:buFont typeface="Wingdings" panose="05000000000000000000" pitchFamily="2" charset="2"/>
-              <a:buChar char="Ø"/>
-            </a:pPr>
-            <a:r>
-              <a:rPr lang="en-US" sz="1800" dirty="0"/>
-              <a:t>Operational Feasibility:</a:t>
-            </a:r>
-          </a:p>
-          <a:p>
-            <a:pPr lvl="1">
-              <a:buFont typeface="Wingdings" panose="05000000000000000000" pitchFamily="2" charset="2"/>
-              <a:buChar char="Ø"/>
-            </a:pPr>
-            <a:r>
-              <a:rPr lang="en-US" sz="1800" dirty="0"/>
-              <a:t>Scheduling Feasibility</a:t>
-            </a:r>
+            <a:endParaRPr lang="en-US" sz="1800" dirty="0"/>
           </a:p>
         </p:txBody>
       </p:sp>
@@ -14321,7 +14302,7 @@
             </a:pPr>
             <a:r>
               <a:rPr lang="en-US" dirty="0"/>
-              <a:t> </a:t>
+              <a:t>  </a:t>
             </a:r>
           </a:p>
         </p:txBody>

</xml_diff>

<commit_message>
2 pages is removed
</commit_message>
<xml_diff>
--- a/HouseRenting.pptx
+++ b/HouseRenting.pptx
@@ -15,8 +15,6 @@
     <p:sldId id="262" r:id="rId9"/>
     <p:sldId id="263" r:id="rId10"/>
     <p:sldId id="264" r:id="rId11"/>
-    <p:sldId id="265" r:id="rId12"/>
-    <p:sldId id="266" r:id="rId13"/>
   </p:sldIdLst>
   <p:sldSz cx="12192000" cy="6858000"/>
   <p:notesSz cx="6858000" cy="9144000"/>
@@ -13575,184 +13573,6 @@
 </p:sld>
 </file>
 
-<file path=ppt/slides/slide11.xml><?xml version="1.0" encoding="utf-8"?>
-<p:sld xmlns:a="http://schemas.openxmlformats.org/drawingml/2006/main" xmlns:r="http://schemas.openxmlformats.org/officeDocument/2006/relationships" xmlns:p="http://schemas.openxmlformats.org/presentationml/2006/main">
-  <p:cSld>
-    <p:spTree>
-      <p:nvGrpSpPr>
-        <p:cNvPr id="1" name=""/>
-        <p:cNvGrpSpPr/>
-        <p:nvPr/>
-      </p:nvGrpSpPr>
-      <p:grpSpPr>
-        <a:xfrm>
-          <a:off x="0" y="0"/>
-          <a:ext cx="0" cy="0"/>
-          <a:chOff x="0" y="0"/>
-          <a:chExt cx="0" cy="0"/>
-        </a:xfrm>
-      </p:grpSpPr>
-      <p:sp>
-        <p:nvSpPr>
-          <p:cNvPr id="2" name="Title 1">
-            <a:extLst>
-              <a:ext uri="{FF2B5EF4-FFF2-40B4-BE49-F238E27FC236}">
-                <a16:creationId xmlns:a16="http://schemas.microsoft.com/office/drawing/2014/main" id="{4ABAD137-DF27-46A2-A18E-A7E7E025E33D}"/>
-              </a:ext>
-            </a:extLst>
-          </p:cNvPr>
-          <p:cNvSpPr>
-            <a:spLocks noGrp="1"/>
-          </p:cNvSpPr>
-          <p:nvPr>
-            <p:ph type="title"/>
-          </p:nvPr>
-        </p:nvSpPr>
-        <p:spPr/>
-        <p:txBody>
-          <a:bodyPr/>
-          <a:lstStyle/>
-          <a:p>
-            <a:r>
-              <a:rPr lang="en-US" dirty="0"/>
-              <a:t>Future Plan</a:t>
-            </a:r>
-          </a:p>
-        </p:txBody>
-      </p:sp>
-      <p:sp>
-        <p:nvSpPr>
-          <p:cNvPr id="3" name="Content Placeholder 2">
-            <a:extLst>
-              <a:ext uri="{FF2B5EF4-FFF2-40B4-BE49-F238E27FC236}">
-                <a16:creationId xmlns:a16="http://schemas.microsoft.com/office/drawing/2014/main" id="{56219843-90CE-4A69-B45E-C2988A3AA3BB}"/>
-              </a:ext>
-            </a:extLst>
-          </p:cNvPr>
-          <p:cNvSpPr>
-            <a:spLocks noGrp="1"/>
-          </p:cNvSpPr>
-          <p:nvPr>
-            <p:ph idx="1"/>
-          </p:nvPr>
-        </p:nvSpPr>
-        <p:spPr/>
-        <p:txBody>
-          <a:bodyPr/>
-          <a:lstStyle/>
-          <a:p>
-            <a:pPr marL="0" indent="0">
-              <a:buNone/>
-            </a:pPr>
-            <a:r>
-              <a:rPr lang="en-US" dirty="0"/>
-              <a:t> </a:t>
-            </a:r>
-          </a:p>
-        </p:txBody>
-      </p:sp>
-    </p:spTree>
-    <p:extLst>
-      <p:ext uri="{BB962C8B-B14F-4D97-AF65-F5344CB8AC3E}">
-        <p14:creationId xmlns:p14="http://schemas.microsoft.com/office/powerpoint/2010/main" val="3456328565"/>
-      </p:ext>
-    </p:extLst>
-  </p:cSld>
-  <p:clrMapOvr>
-    <a:masterClrMapping/>
-  </p:clrMapOvr>
-</p:sld>
-</file>
-
-<file path=ppt/slides/slide12.xml><?xml version="1.0" encoding="utf-8"?>
-<p:sld xmlns:a="http://schemas.openxmlformats.org/drawingml/2006/main" xmlns:r="http://schemas.openxmlformats.org/officeDocument/2006/relationships" xmlns:p="http://schemas.openxmlformats.org/presentationml/2006/main">
-  <p:cSld>
-    <p:spTree>
-      <p:nvGrpSpPr>
-        <p:cNvPr id="1" name=""/>
-        <p:cNvGrpSpPr/>
-        <p:nvPr/>
-      </p:nvGrpSpPr>
-      <p:grpSpPr>
-        <a:xfrm>
-          <a:off x="0" y="0"/>
-          <a:ext cx="0" cy="0"/>
-          <a:chOff x="0" y="0"/>
-          <a:chExt cx="0" cy="0"/>
-        </a:xfrm>
-      </p:grpSpPr>
-      <p:sp>
-        <p:nvSpPr>
-          <p:cNvPr id="2" name="Title 1">
-            <a:extLst>
-              <a:ext uri="{FF2B5EF4-FFF2-40B4-BE49-F238E27FC236}">
-                <a16:creationId xmlns:a16="http://schemas.microsoft.com/office/drawing/2014/main" id="{4ABAD137-DF27-46A2-A18E-A7E7E025E33D}"/>
-              </a:ext>
-            </a:extLst>
-          </p:cNvPr>
-          <p:cNvSpPr>
-            <a:spLocks noGrp="1"/>
-          </p:cNvSpPr>
-          <p:nvPr>
-            <p:ph type="title"/>
-          </p:nvPr>
-        </p:nvSpPr>
-        <p:spPr/>
-        <p:txBody>
-          <a:bodyPr/>
-          <a:lstStyle/>
-          <a:p>
-            <a:r>
-              <a:rPr lang="en-US" dirty="0"/>
-              <a:t>Conclusion</a:t>
-            </a:r>
-          </a:p>
-        </p:txBody>
-      </p:sp>
-      <p:sp>
-        <p:nvSpPr>
-          <p:cNvPr id="3" name="Content Placeholder 2">
-            <a:extLst>
-              <a:ext uri="{FF2B5EF4-FFF2-40B4-BE49-F238E27FC236}">
-                <a16:creationId xmlns:a16="http://schemas.microsoft.com/office/drawing/2014/main" id="{56219843-90CE-4A69-B45E-C2988A3AA3BB}"/>
-              </a:ext>
-            </a:extLst>
-          </p:cNvPr>
-          <p:cNvSpPr>
-            <a:spLocks noGrp="1"/>
-          </p:cNvSpPr>
-          <p:nvPr>
-            <p:ph idx="1"/>
-          </p:nvPr>
-        </p:nvSpPr>
-        <p:spPr/>
-        <p:txBody>
-          <a:bodyPr/>
-          <a:lstStyle/>
-          <a:p>
-            <a:pPr marL="0" indent="0">
-              <a:buNone/>
-            </a:pPr>
-            <a:r>
-              <a:rPr lang="en-US" dirty="0"/>
-              <a:t> </a:t>
-            </a:r>
-          </a:p>
-        </p:txBody>
-      </p:sp>
-    </p:spTree>
-    <p:extLst>
-      <p:ext uri="{BB962C8B-B14F-4D97-AF65-F5344CB8AC3E}">
-        <p14:creationId xmlns:p14="http://schemas.microsoft.com/office/powerpoint/2010/main" val="2297170349"/>
-      </p:ext>
-    </p:extLst>
-  </p:cSld>
-  <p:clrMapOvr>
-    <a:masterClrMapping/>
-  </p:clrMapOvr>
-</p:sld>
-</file>
-
 <file path=ppt/slides/slide2.xml><?xml version="1.0" encoding="utf-8"?>
 <p:sld xmlns:a="http://schemas.openxmlformats.org/drawingml/2006/main" xmlns:r="http://schemas.openxmlformats.org/officeDocument/2006/relationships" xmlns:p="http://schemas.openxmlformats.org/presentationml/2006/main">
   <p:cSld>
@@ -14211,10 +14031,13 @@
               <a:buChar char="Ø"/>
             </a:pPr>
             <a:r>
-              <a:rPr lang="en-US" sz="1800"/>
-              <a:t>Environmenttal:</a:t>
+              <a:rPr lang="en-US" sz="1800" dirty="0" err="1"/>
+              <a:t>Environmenttal</a:t>
             </a:r>
-            <a:endParaRPr lang="en-US" sz="1800" dirty="0"/>
+            <a:r>
+              <a:rPr lang="en-US" sz="1800" dirty="0"/>
+              <a:t>:</a:t>
+            </a:r>
           </a:p>
         </p:txBody>
       </p:sp>
@@ -14297,12 +14120,23 @@
           <a:bodyPr/>
           <a:lstStyle/>
           <a:p>
-            <a:pPr marL="0" indent="0">
-              <a:buNone/>
+            <a:pPr>
+              <a:buFont typeface="Wingdings" panose="05000000000000000000" pitchFamily="2" charset="2"/>
+              <a:buChar char="q"/>
             </a:pPr>
             <a:r>
               <a:rPr lang="en-US" dirty="0"/>
-              <a:t>  </a:t>
+              <a:t>Industrial: This Project is used as business purposes. </a:t>
+            </a:r>
+          </a:p>
+          <a:p>
+            <a:pPr>
+              <a:buFont typeface="Wingdings" panose="05000000000000000000" pitchFamily="2" charset="2"/>
+              <a:buChar char="q"/>
+            </a:pPr>
+            <a:r>
+              <a:rPr lang="en-US" dirty="0"/>
+              <a:t>Academic:</a:t>
             </a:r>
           </a:p>
         </p:txBody>

</xml_diff>

<commit_message>
some tect is added
</commit_message>
<xml_diff>
--- a/HouseRenting.pptx
+++ b/HouseRenting.pptx
@@ -13523,7 +13523,7 @@
           <a:p>
             <a:r>
               <a:rPr lang="en-US" dirty="0"/>
-              <a:t>Weakness of Our Project</a:t>
+              <a:t>Risk of Our Project</a:t>
             </a:r>
           </a:p>
         </p:txBody>
@@ -13555,7 +13555,37 @@
             </a:pPr>
             <a:r>
               <a:rPr lang="en-US" dirty="0"/>
-              <a:t> </a:t>
+              <a:t>Node.js is recent technology. So outcoming problem handle is more challenge.</a:t>
+            </a:r>
+          </a:p>
+          <a:p>
+            <a:pPr>
+              <a:buFont typeface="Wingdings" panose="05000000000000000000" pitchFamily="2" charset="2"/>
+              <a:buChar char="q"/>
+            </a:pPr>
+            <a:r>
+              <a:rPr lang="en-US" dirty="0"/>
+              <a:t>There is no good community scope.</a:t>
+            </a:r>
+          </a:p>
+          <a:p>
+            <a:pPr>
+              <a:buFont typeface="Wingdings" panose="05000000000000000000" pitchFamily="2" charset="2"/>
+              <a:buChar char="q"/>
+            </a:pPr>
+            <a:r>
+              <a:rPr lang="en-US" dirty="0"/>
+              <a:t>The information of house advertiser keep secure is more challenge.</a:t>
+            </a:r>
+          </a:p>
+          <a:p>
+            <a:pPr>
+              <a:buFont typeface="Wingdings" panose="05000000000000000000" pitchFamily="2" charset="2"/>
+              <a:buChar char="q"/>
+            </a:pPr>
+            <a:r>
+              <a:rPr lang="en-US" dirty="0"/>
+              <a:t>Sometimes bad people to take information, subscription is apply on house advertiser.</a:t>
             </a:r>
           </a:p>
         </p:txBody>
@@ -14031,8 +14061,8 @@
               <a:buChar char="Ø"/>
             </a:pPr>
             <a:r>
-              <a:rPr lang="en-US" sz="1800" dirty="0" err="1"/>
-              <a:t>Environmenttal</a:t>
+              <a:rPr lang="en-US" sz="1800"/>
+              <a:t>Environmental</a:t>
             </a:r>
             <a:r>
               <a:rPr lang="en-US" sz="1800" dirty="0"/>
@@ -14215,7 +14245,7 @@
             <p:ph idx="1"/>
             <p:extLst>
               <p:ext uri="{D42A27DB-BD31-4B8C-83A1-F6EECF244321}">
-                <p14:modId xmlns:p14="http://schemas.microsoft.com/office/powerpoint/2010/main" val="2870255533"/>
+                <p14:modId xmlns:p14="http://schemas.microsoft.com/office/powerpoint/2010/main" val="2947408939"/>
               </p:ext>
             </p:extLst>
           </p:nvPr>
@@ -14742,13 +14772,21 @@
           <a:bodyPr/>
           <a:lstStyle/>
           <a:p>
-            <a:pPr marL="0" indent="0">
-              <a:buNone/>
+            <a:pPr>
+              <a:buFont typeface="Wingdings" panose="05000000000000000000" pitchFamily="2" charset="2"/>
+              <a:buChar char="q"/>
             </a:pPr>
             <a:r>
-              <a:rPr lang="en-US" dirty="0"/>
-              <a:t> </a:t>
+              <a:rPr lang="en-US"/>
+              <a:t>Complete business Platform.</a:t>
             </a:r>
+          </a:p>
+          <a:p>
+            <a:pPr>
+              <a:buFont typeface="Wingdings" panose="05000000000000000000" pitchFamily="2" charset="2"/>
+              <a:buChar char="q"/>
+            </a:pPr>
+            <a:endParaRPr lang="en-US" dirty="0"/>
           </a:p>
         </p:txBody>
       </p:sp>

</xml_diff>

<commit_message>
client and server sile is exachnged
</commit_message>
<xml_diff>
--- a/HouseRenting.pptx
+++ b/HouseRenting.pptx
@@ -14245,13 +14245,13 @@
             <p:ph idx="1"/>
             <p:extLst>
               <p:ext uri="{D42A27DB-BD31-4B8C-83A1-F6EECF244321}">
-                <p14:modId xmlns:p14="http://schemas.microsoft.com/office/powerpoint/2010/main" val="2947408939"/>
+                <p14:modId xmlns:p14="http://schemas.microsoft.com/office/powerpoint/2010/main" val="1318495324"/>
               </p:ext>
             </p:extLst>
           </p:nvPr>
         </p:nvGraphicFramePr>
         <p:xfrm>
-          <a:off x="1694962" y="2800448"/>
+          <a:off x="6656342" y="2941125"/>
           <a:ext cx="4401038" cy="2880360"/>
         </p:xfrm>
         <a:graphic>
@@ -14456,14 +14456,14 @@
           <p:nvPr>
             <p:extLst>
               <p:ext uri="{D42A27DB-BD31-4B8C-83A1-F6EECF244321}">
-                <p14:modId xmlns:p14="http://schemas.microsoft.com/office/powerpoint/2010/main" val="520541432"/>
+                <p14:modId xmlns:p14="http://schemas.microsoft.com/office/powerpoint/2010/main" val="1364718104"/>
               </p:ext>
             </p:extLst>
           </p:nvPr>
         </p:nvGraphicFramePr>
         <p:xfrm>
-          <a:off x="6283571" y="2800448"/>
-          <a:ext cx="4401038" cy="2194560"/>
+          <a:off x="1694962" y="2941125"/>
+          <a:ext cx="4401038" cy="2529840"/>
         </p:xfrm>
         <a:graphic>
           <a:graphicData uri="http://schemas.openxmlformats.org/drawingml/2006/table">
@@ -14567,6 +14567,16 @@
                         <a:t>Bootstrap 4</a:t>
                       </a:r>
                     </a:p>
+                    <a:p>
+                      <a:pPr marL="800100" lvl="1" indent="-342900">
+                        <a:buFont typeface="Wingdings" panose="05000000000000000000" pitchFamily="2" charset="2"/>
+                        <a:buChar char="Ø"/>
+                      </a:pPr>
+                      <a:r>
+                        <a:rPr lang="en-US" sz="2200" dirty="0"/>
+                        <a:t>Angular Materials</a:t>
+                      </a:r>
+                    </a:p>
                   </a:txBody>
                   <a:tcPr/>
                 </a:tc>
@@ -14777,7 +14787,7 @@
               <a:buChar char="q"/>
             </a:pPr>
             <a:r>
-              <a:rPr lang="en-US"/>
+              <a:rPr lang="en-US" dirty="0"/>
               <a:t>Complete business Platform.</a:t>
             </a:r>
           </a:p>

</xml_diff>

<commit_message>
Some content is added
</commit_message>
<xml_diff>
--- a/HouseRenting.pptx
+++ b/HouseRenting.pptx
@@ -13585,7 +13585,7 @@
             </a:pPr>
             <a:r>
               <a:rPr lang="en-US" dirty="0"/>
-              <a:t>Sometimes bad people to take information, subscription is apply on house advertiser.</a:t>
+              <a:t>Sometimes bad people to take information and subscription is apply on house advertiser.</a:t>
             </a:r>
           </a:p>
         </p:txBody>
@@ -13675,7 +13675,7 @@
             </a:pPr>
             <a:r>
               <a:rPr lang="en-US" sz="2000" dirty="0"/>
-              <a:t>House renting is a process that is People can advertising his or her own house or People can view house advertisement who want to rent house.</a:t>
+              <a:t>House renting is a system that is People can advertising his or her own house or People can view house advertisement who want to rent house.</a:t>
             </a:r>
           </a:p>
           <a:p>
@@ -13686,16 +13686,6 @@
             <a:r>
               <a:rPr lang="en-US" sz="2000" dirty="0"/>
               <a:t>People can easily find expected house for rent.</a:t>
-            </a:r>
-          </a:p>
-          <a:p>
-            <a:pPr>
-              <a:buFont typeface="Wingdings" panose="05000000000000000000" pitchFamily="2" charset="2"/>
-              <a:buChar char="q"/>
-            </a:pPr>
-            <a:r>
-              <a:rPr lang="en-US" sz="2000" dirty="0"/>
-              <a:t>It is reduce time and cost.</a:t>
             </a:r>
           </a:p>
         </p:txBody>
@@ -14032,7 +14022,7 @@
             </a:pPr>
             <a:r>
               <a:rPr lang="en-US" sz="2000" dirty="0"/>
-              <a:t>A feasibility study evaluates the project’s potential for success. There are five types of feasibility study:</a:t>
+              <a:t>A feasibility study evaluates the project’s potential for success.</a:t>
             </a:r>
           </a:p>
           <a:p>
@@ -14042,7 +14032,7 @@
             </a:pPr>
             <a:r>
               <a:rPr lang="en-US" sz="1800" dirty="0"/>
-              <a:t>Technical Feasibility: </a:t>
+              <a:t>Technical Feasibility: I have 1year experience on angular for font end design and 6month experience on node.js framework for back end design.</a:t>
             </a:r>
           </a:p>
           <a:p>
@@ -14052,7 +14042,7 @@
             </a:pPr>
             <a:r>
               <a:rPr lang="en-US" sz="1800" dirty="0"/>
-              <a:t>Economic Feasibility:</a:t>
+              <a:t>Economic Feasibility: </a:t>
             </a:r>
           </a:p>
           <a:p>
@@ -14061,12 +14051,8 @@
               <a:buChar char="Ø"/>
             </a:pPr>
             <a:r>
-              <a:rPr lang="en-US" sz="1800"/>
-              <a:t>Environmental</a:t>
-            </a:r>
-            <a:r>
               <a:rPr lang="en-US" sz="1800" dirty="0"/>
-              <a:t>:</a:t>
+              <a:t>Environmental:</a:t>
             </a:r>
           </a:p>
         </p:txBody>
@@ -14166,7 +14152,17 @@
             </a:pPr>
             <a:r>
               <a:rPr lang="en-US" dirty="0"/>
-              <a:t>Academic:</a:t>
+              <a:t>Actually this project is popular in urban area.</a:t>
+            </a:r>
+          </a:p>
+          <a:p>
+            <a:pPr>
+              <a:buFont typeface="Wingdings" panose="05000000000000000000" pitchFamily="2" charset="2"/>
+              <a:buChar char="q"/>
+            </a:pPr>
+            <a:r>
+              <a:rPr lang="en-US" dirty="0"/>
+              <a:t>All class of professionals will be most popularities.</a:t>
             </a:r>
           </a:p>
         </p:txBody>
@@ -14796,7 +14792,20 @@
               <a:buFont typeface="Wingdings" panose="05000000000000000000" pitchFamily="2" charset="2"/>
               <a:buChar char="q"/>
             </a:pPr>
-            <a:endParaRPr lang="en-US" dirty="0"/>
+            <a:r>
+              <a:rPr lang="en-US" dirty="0"/>
+              <a:t>It is reduce time and cost for both renter and advertiser.</a:t>
+            </a:r>
+          </a:p>
+          <a:p>
+            <a:pPr>
+              <a:buFont typeface="Wingdings" panose="05000000000000000000" pitchFamily="2" charset="2"/>
+              <a:buChar char="q"/>
+            </a:pPr>
+            <a:r>
+              <a:rPr lang="en-US" dirty="0"/>
+              <a:t>It is help to hurry up to find  a house for rent.</a:t>
+            </a:r>
           </a:p>
         </p:txBody>
       </p:sp>

</xml_diff>

<commit_message>
some error ia corrected
</commit_message>
<xml_diff>
--- a/HouseRenting.pptx
+++ b/HouseRenting.pptx
@@ -14232,15 +14232,7 @@
             </a:pPr>
             <a:r>
               <a:rPr lang="en-US" sz="2000" dirty="0"/>
-              <a:t>House renting is a web application that is people </a:t>
-            </a:r>
-            <a:r>
-              <a:rPr lang="en-US" sz="2000"/>
-              <a:t>can advertise their </a:t>
-            </a:r>
-            <a:r>
-              <a:rPr lang="en-US" sz="2000" dirty="0"/>
-              <a:t>own house and people can view house advertisement who want to rent house.</a:t>
+              <a:t>House renting is a web application that is people can advertise their own house and people can view house advertisement who want to rent house.</a:t>
             </a:r>
           </a:p>
         </p:txBody>
@@ -14879,7 +14871,15 @@
             </a:pPr>
             <a:r>
               <a:rPr lang="en-US" dirty="0"/>
-              <a:t>Actually, this project is popular in urban area.</a:t>
+              <a:t>Actually, this </a:t>
+            </a:r>
+            <a:r>
+              <a:rPr lang="en-US"/>
+              <a:t>project will be </a:t>
+            </a:r>
+            <a:r>
+              <a:rPr lang="en-US" dirty="0"/>
+              <a:t>popular in urban area.</a:t>
             </a:r>
           </a:p>
           <a:p>

</xml_diff>

<commit_message>
new page is added
</commit_message>
<xml_diff>
--- a/HouseRenting.pptx
+++ b/HouseRenting.pptx
@@ -5,7 +5,7 @@
     <p:sldMasterId id="2147483762" r:id="rId1"/>
   </p:sldMasterIdLst>
   <p:notesMasterIdLst>
-    <p:notesMasterId r:id="rId14"/>
+    <p:notesMasterId r:id="rId15"/>
   </p:notesMasterIdLst>
   <p:sldIdLst>
     <p:sldId id="256" r:id="rId2"/>
@@ -20,6 +20,7 @@
     <p:sldId id="268" r:id="rId11"/>
     <p:sldId id="269" r:id="rId12"/>
     <p:sldId id="263" r:id="rId13"/>
+    <p:sldId id="271" r:id="rId14"/>
   </p:sldIdLst>
   <p:sldSz cx="12192000" cy="6858000"/>
   <p:notesSz cx="6858000" cy="9144000"/>
@@ -14253,6 +14254,94 @@
 </p:sld>
 </file>
 
+<file path=ppt/slides/slide13.xml><?xml version="1.0" encoding="utf-8"?>
+<p:sld xmlns:a="http://schemas.openxmlformats.org/drawingml/2006/main" xmlns:r="http://schemas.openxmlformats.org/officeDocument/2006/relationships" xmlns:p="http://schemas.openxmlformats.org/presentationml/2006/main">
+  <p:cSld>
+    <p:spTree>
+      <p:nvGrpSpPr>
+        <p:cNvPr id="1" name=""/>
+        <p:cNvGrpSpPr/>
+        <p:nvPr/>
+      </p:nvGrpSpPr>
+      <p:grpSpPr>
+        <a:xfrm>
+          <a:off x="0" y="0"/>
+          <a:ext cx="0" cy="0"/>
+          <a:chOff x="0" y="0"/>
+          <a:chExt cx="0" cy="0"/>
+        </a:xfrm>
+      </p:grpSpPr>
+      <p:sp>
+        <p:nvSpPr>
+          <p:cNvPr id="2" name="Title 1">
+            <a:extLst>
+              <a:ext uri="{FF2B5EF4-FFF2-40B4-BE49-F238E27FC236}">
+                <a16:creationId xmlns:a16="http://schemas.microsoft.com/office/drawing/2014/main" id="{36EF07C1-A9A1-4196-8540-23D3F93FA6F8}"/>
+              </a:ext>
+            </a:extLst>
+          </p:cNvPr>
+          <p:cNvSpPr>
+            <a:spLocks noGrp="1"/>
+          </p:cNvSpPr>
+          <p:nvPr>
+            <p:ph type="title"/>
+          </p:nvPr>
+        </p:nvSpPr>
+        <p:spPr/>
+        <p:txBody>
+          <a:bodyPr/>
+          <a:lstStyle/>
+          <a:p>
+            <a:endParaRPr lang="en-US" dirty="0"/>
+          </a:p>
+        </p:txBody>
+      </p:sp>
+      <p:sp>
+        <p:nvSpPr>
+          <p:cNvPr id="3" name="Content Placeholder 2">
+            <a:extLst>
+              <a:ext uri="{FF2B5EF4-FFF2-40B4-BE49-F238E27FC236}">
+                <a16:creationId xmlns:a16="http://schemas.microsoft.com/office/drawing/2014/main" id="{69386492-254C-4424-B8C0-F324E0897AEA}"/>
+              </a:ext>
+            </a:extLst>
+          </p:cNvPr>
+          <p:cNvSpPr>
+            <a:spLocks noGrp="1"/>
+          </p:cNvSpPr>
+          <p:nvPr>
+            <p:ph idx="1"/>
+          </p:nvPr>
+        </p:nvSpPr>
+        <p:spPr/>
+        <p:txBody>
+          <a:bodyPr>
+            <a:normAutofit/>
+          </a:bodyPr>
+          <a:lstStyle/>
+          <a:p>
+            <a:pPr marL="0" indent="0" algn="ctr">
+              <a:buNone/>
+            </a:pPr>
+            <a:r>
+              <a:rPr lang="en-US" sz="6000" dirty="0"/>
+              <a:t>Thank You</a:t>
+            </a:r>
+          </a:p>
+        </p:txBody>
+      </p:sp>
+    </p:spTree>
+    <p:extLst>
+      <p:ext uri="{BB962C8B-B14F-4D97-AF65-F5344CB8AC3E}">
+        <p14:creationId xmlns:p14="http://schemas.microsoft.com/office/powerpoint/2010/main" val="313313020"/>
+      </p:ext>
+    </p:extLst>
+  </p:cSld>
+  <p:clrMapOvr>
+    <a:masterClrMapping/>
+  </p:clrMapOvr>
+</p:sld>
+</file>
+
 <file path=ppt/slides/slide2.xml><?xml version="1.0" encoding="utf-8"?>
 <p:sld xmlns:a="http://schemas.openxmlformats.org/drawingml/2006/main" xmlns:r="http://schemas.openxmlformats.org/officeDocument/2006/relationships" xmlns:p="http://schemas.openxmlformats.org/presentationml/2006/main">
   <p:cSld>
@@ -14535,12 +14624,8 @@
               <a:buChar char="q"/>
             </a:pPr>
             <a:r>
-              <a:rPr lang="en-US"/>
-              <a:t>An advertiser </a:t>
-            </a:r>
-            <a:r>
               <a:rPr lang="en-US" dirty="0"/>
-              <a:t>advising his house with picture and description and other necessary things and other people view advertise who want to house rent.</a:t>
+              <a:t>An advertiser advising his house with picture and description and other necessary things and other people view advertise who want to house rent.</a:t>
             </a:r>
           </a:p>
           <a:p>

</xml_diff>